<commit_message>
interactive graphic changes and update files
</commit_message>
<xml_diff>
--- a/assets/files/Wiley Researcher Tools PPT.pptx
+++ b/assets/files/Wiley Researcher Tools PPT.pptx
@@ -5,19 +5,21 @@
     <p:sldMasterId id="2147483648" r:id="rId1"/>
   </p:sldMasterIdLst>
   <p:notesMasterIdLst>
-    <p:notesMasterId r:id="rId9"/>
+    <p:notesMasterId r:id="rId11"/>
   </p:notesMasterIdLst>
   <p:handoutMasterIdLst>
-    <p:handoutMasterId r:id="rId10"/>
+    <p:handoutMasterId r:id="rId12"/>
   </p:handoutMasterIdLst>
   <p:sldIdLst>
-    <p:sldId id="256" r:id="rId2"/>
-    <p:sldId id="258" r:id="rId3"/>
-    <p:sldId id="260" r:id="rId4"/>
-    <p:sldId id="257" r:id="rId5"/>
-    <p:sldId id="261" r:id="rId6"/>
-    <p:sldId id="262" r:id="rId7"/>
-    <p:sldId id="263" r:id="rId8"/>
+    <p:sldId id="264" r:id="rId2"/>
+    <p:sldId id="256" r:id="rId3"/>
+    <p:sldId id="265" r:id="rId4"/>
+    <p:sldId id="258" r:id="rId5"/>
+    <p:sldId id="260" r:id="rId6"/>
+    <p:sldId id="257" r:id="rId7"/>
+    <p:sldId id="261" r:id="rId8"/>
+    <p:sldId id="262" r:id="rId9"/>
+    <p:sldId id="263" r:id="rId10"/>
   </p:sldIdLst>
   <p:sldSz cx="9144000" cy="6858000" type="screen4x3"/>
   <p:notesSz cx="6797675" cy="9926638"/>
@@ -118,7 +120,7 @@
   </p:defaultTextStyle>
   <p:extLst>
     <p:ext uri="{EFAFB233-063F-42B5-8137-9DF3F51BA10A}">
-      <p15:sldGuideLst xmlns:p15="http://schemas.microsoft.com/office/powerpoint/2012/main" xmlns="">
+      <p15:sldGuideLst xmlns:p15="http://schemas.microsoft.com/office/powerpoint/2012/main">
         <p15:guide id="1" orient="horz" pos="2160">
           <p15:clr>
             <a:srgbClr val="A4A3A4"/>
@@ -132,7 +134,7 @@
       </p15:sldGuideLst>
     </p:ext>
     <p:ext uri="{2D200454-40CA-4A62-9FC3-DE9A4176ACB9}">
-      <p15:notesGuideLst xmlns:p15="http://schemas.microsoft.com/office/powerpoint/2012/main" xmlns="">
+      <p15:notesGuideLst xmlns:p15="http://schemas.microsoft.com/office/powerpoint/2012/main">
         <p15:guide id="1" orient="horz" pos="2880">
           <p15:clr>
             <a:srgbClr val="A4A3A4"/>
@@ -143,10 +145,24 @@
             <a:srgbClr val="A4A3A4"/>
           </p15:clr>
         </p15:guide>
+        <p15:guide id="3" orient="horz" pos="3127">
+          <p15:clr>
+            <a:srgbClr val="A4A3A4"/>
+          </p15:clr>
+        </p15:guide>
+        <p15:guide id="4" pos="2141">
+          <p15:clr>
+            <a:srgbClr val="A4A3A4"/>
+          </p15:clr>
+        </p15:guide>
       </p15:notesGuideLst>
     </p:ext>
   </p:extLst>
 </p:presentation>
+</file>
+
+<file path=ppt/revisionInfo.xml><?xml version="1.0" encoding="utf-8"?>
+<p1510:revInfo xmlns:a="http://schemas.openxmlformats.org/drawingml/2006/main" xmlns:r="http://schemas.openxmlformats.org/officeDocument/2006/relationships" xmlns:p1510="http://schemas.microsoft.com/office/powerpoint/2015/10/main"/>
 </file>
 
 <file path=ppt/handoutMasters/handoutMaster1.xml><?xml version="1.0" encoding="utf-8"?>
@@ -231,7 +247,7 @@
           <a:p>
             <a:fld id="{62C85159-F750-4B8D-A800-BDE2EAFB0EF7}" type="datetimeFigureOut">
               <a:rPr lang="en-US" smtClean="0"/>
-              <a:t>11/27/2017</a:t>
+              <a:t>3/1/2018</a:t>
             </a:fld>
             <a:endParaRPr lang="en-US"/>
           </a:p>
@@ -396,7 +412,7 @@
           <a:p>
             <a:fld id="{826BBB2F-26D5-4DB8-B055-8D602DFA19C8}" type="datetimeFigureOut">
               <a:rPr lang="en-GB" smtClean="0"/>
-              <a:t>27/11/2017</a:t>
+              <a:t>01/03/2018</a:t>
             </a:fld>
             <a:endParaRPr lang="en-GB" dirty="0"/>
           </a:p>
@@ -734,7 +750,7 @@
           <a:p>
             <a:fld id="{9024D616-BD1D-486C-B507-7A6E71FC1B22}" type="slidenum">
               <a:rPr lang="en-GB" smtClean="0"/>
-              <a:t>2</a:t>
+              <a:t>3</a:t>
             </a:fld>
             <a:endParaRPr lang="en-GB" dirty="0"/>
           </a:p>
@@ -743,7 +759,7 @@
     </p:spTree>
     <p:extLst>
       <p:ext uri="{BB962C8B-B14F-4D97-AF65-F5344CB8AC3E}">
-        <p14:creationId xmlns:p14="http://schemas.microsoft.com/office/powerpoint/2010/main" val="529926679"/>
+        <p14:creationId xmlns:p14="http://schemas.microsoft.com/office/powerpoint/2010/main" val="80281145"/>
       </p:ext>
     </p:extLst>
   </p:cSld>
@@ -823,7 +839,7 @@
           <a:p>
             <a:fld id="{9024D616-BD1D-486C-B507-7A6E71FC1B22}" type="slidenum">
               <a:rPr lang="en-GB" smtClean="0"/>
-              <a:t>3</a:t>
+              <a:t>4</a:t>
             </a:fld>
             <a:endParaRPr lang="en-GB" dirty="0"/>
           </a:p>
@@ -912,7 +928,7 @@
           <a:p>
             <a:fld id="{9024D616-BD1D-486C-B507-7A6E71FC1B22}" type="slidenum">
               <a:rPr lang="en-GB" smtClean="0"/>
-              <a:t>4</a:t>
+              <a:t>5</a:t>
             </a:fld>
             <a:endParaRPr lang="en-GB" dirty="0"/>
           </a:p>
@@ -1001,7 +1017,7 @@
           <a:p>
             <a:fld id="{9024D616-BD1D-486C-B507-7A6E71FC1B22}" type="slidenum">
               <a:rPr lang="en-GB" smtClean="0"/>
-              <a:t>5</a:t>
+              <a:t>6</a:t>
             </a:fld>
             <a:endParaRPr lang="en-GB" dirty="0"/>
           </a:p>
@@ -1090,7 +1106,7 @@
           <a:p>
             <a:fld id="{9024D616-BD1D-486C-B507-7A6E71FC1B22}" type="slidenum">
               <a:rPr lang="en-GB" smtClean="0"/>
-              <a:t>6</a:t>
+              <a:t>7</a:t>
             </a:fld>
             <a:endParaRPr lang="en-GB" dirty="0"/>
           </a:p>
@@ -1179,7 +1195,96 @@
           <a:p>
             <a:fld id="{9024D616-BD1D-486C-B507-7A6E71FC1B22}" type="slidenum">
               <a:rPr lang="en-GB" smtClean="0"/>
-              <a:t>7</a:t>
+              <a:t>8</a:t>
+            </a:fld>
+            <a:endParaRPr lang="en-GB" dirty="0"/>
+          </a:p>
+        </p:txBody>
+      </p:sp>
+    </p:spTree>
+    <p:extLst>
+      <p:ext uri="{BB962C8B-B14F-4D97-AF65-F5344CB8AC3E}">
+        <p14:creationId xmlns:p14="http://schemas.microsoft.com/office/powerpoint/2010/main" val="529926679"/>
+      </p:ext>
+    </p:extLst>
+  </p:cSld>
+  <p:clrMapOvr>
+    <a:masterClrMapping/>
+  </p:clrMapOvr>
+</p:notes>
+</file>
+
+<file path=ppt/notesSlides/notesSlide7.xml><?xml version="1.0" encoding="utf-8"?>
+<p:notes xmlns:a="http://schemas.openxmlformats.org/drawingml/2006/main" xmlns:r="http://schemas.openxmlformats.org/officeDocument/2006/relationships" xmlns:p="http://schemas.openxmlformats.org/presentationml/2006/main">
+  <p:cSld>
+    <p:spTree>
+      <p:nvGrpSpPr>
+        <p:cNvPr id="1" name=""/>
+        <p:cNvGrpSpPr/>
+        <p:nvPr/>
+      </p:nvGrpSpPr>
+      <p:grpSpPr>
+        <a:xfrm>
+          <a:off x="0" y="0"/>
+          <a:ext cx="0" cy="0"/>
+          <a:chOff x="0" y="0"/>
+          <a:chExt cx="0" cy="0"/>
+        </a:xfrm>
+      </p:grpSpPr>
+      <p:sp>
+        <p:nvSpPr>
+          <p:cNvPr id="2" name="Slide Image Placeholder 1"/>
+          <p:cNvSpPr>
+            <a:spLocks noGrp="1" noRot="1" noChangeAspect="1"/>
+          </p:cNvSpPr>
+          <p:nvPr>
+            <p:ph type="sldImg"/>
+          </p:nvPr>
+        </p:nvSpPr>
+        <p:spPr>
+          <a:xfrm>
+            <a:off x="917575" y="744538"/>
+            <a:ext cx="4962525" cy="3722687"/>
+          </a:xfrm>
+        </p:spPr>
+      </p:sp>
+      <p:sp>
+        <p:nvSpPr>
+          <p:cNvPr id="3" name="Notes Placeholder 2"/>
+          <p:cNvSpPr>
+            <a:spLocks noGrp="1"/>
+          </p:cNvSpPr>
+          <p:nvPr>
+            <p:ph type="body" idx="1"/>
+          </p:nvPr>
+        </p:nvSpPr>
+        <p:spPr/>
+        <p:txBody>
+          <a:bodyPr/>
+          <a:lstStyle/>
+          <a:p>
+            <a:endParaRPr lang="en-GB" dirty="0"/>
+          </a:p>
+        </p:txBody>
+      </p:sp>
+      <p:sp>
+        <p:nvSpPr>
+          <p:cNvPr id="4" name="Slide Number Placeholder 3"/>
+          <p:cNvSpPr>
+            <a:spLocks noGrp="1"/>
+          </p:cNvSpPr>
+          <p:nvPr>
+            <p:ph type="sldNum" sz="quarter" idx="10"/>
+          </p:nvPr>
+        </p:nvSpPr>
+        <p:spPr/>
+        <p:txBody>
+          <a:bodyPr/>
+          <a:lstStyle/>
+          <a:p>
+            <a:fld id="{9024D616-BD1D-486C-B507-7A6E71FC1B22}" type="slidenum">
+              <a:rPr lang="en-GB" smtClean="0"/>
+              <a:t>9</a:t>
             </a:fld>
             <a:endParaRPr lang="en-GB" dirty="0"/>
           </a:p>
@@ -1379,7 +1484,7 @@
           <a:p>
             <a:fld id="{1DDC5609-1156-4F3C-8D48-AA76FA0D3182}" type="datetimeFigureOut">
               <a:rPr lang="en-GB" smtClean="0"/>
-              <a:t>27/11/2017</a:t>
+              <a:t>01/03/2018</a:t>
             </a:fld>
             <a:endParaRPr lang="en-GB" dirty="0"/>
           </a:p>
@@ -1437,13 +1542,6 @@
   <p:clrMapOvr>
     <a:masterClrMapping/>
   </p:clrMapOvr>
-  <p:timing>
-    <p:tnLst>
-      <p:par>
-        <p:cTn id="1" dur="indefinite" restart="never" nodeType="tmRoot"/>
-      </p:par>
-    </p:tnLst>
-  </p:timing>
 </p:sldLayout>
 </file>
 
@@ -1556,7 +1654,7 @@
           <a:p>
             <a:fld id="{1DDC5609-1156-4F3C-8D48-AA76FA0D3182}" type="datetimeFigureOut">
               <a:rPr lang="en-GB" smtClean="0"/>
-              <a:t>27/11/2017</a:t>
+              <a:t>01/03/2018</a:t>
             </a:fld>
             <a:endParaRPr lang="en-GB" dirty="0"/>
           </a:p>
@@ -1736,7 +1834,7 @@
           <a:p>
             <a:fld id="{1DDC5609-1156-4F3C-8D48-AA76FA0D3182}" type="datetimeFigureOut">
               <a:rPr lang="en-GB" smtClean="0"/>
-              <a:t>27/11/2017</a:t>
+              <a:t>01/03/2018</a:t>
             </a:fld>
             <a:endParaRPr lang="en-GB" dirty="0"/>
           </a:p>
@@ -1788,6 +1886,462 @@
     <p:extLst>
       <p:ext uri="{BB962C8B-B14F-4D97-AF65-F5344CB8AC3E}">
         <p14:creationId xmlns:p14="http://schemas.microsoft.com/office/powerpoint/2010/main" val="1090472031"/>
+      </p:ext>
+    </p:extLst>
+  </p:cSld>
+  <p:clrMapOvr>
+    <a:masterClrMapping/>
+  </p:clrMapOvr>
+</p:sldLayout>
+</file>
+
+<file path=ppt/slideLayouts/slideLayout12.xml><?xml version="1.0" encoding="utf-8"?>
+<p:sldLayout xmlns:a="http://schemas.openxmlformats.org/drawingml/2006/main" xmlns:r="http://schemas.openxmlformats.org/officeDocument/2006/relationships" xmlns:p="http://schemas.openxmlformats.org/presentationml/2006/main" userDrawn="1">
+  <p:cSld name="Large Media with Text">
+    <p:spTree>
+      <p:nvGrpSpPr>
+        <p:cNvPr id="1" name=""/>
+        <p:cNvGrpSpPr/>
+        <p:nvPr/>
+      </p:nvGrpSpPr>
+      <p:grpSpPr>
+        <a:xfrm>
+          <a:off x="0" y="0"/>
+          <a:ext cx="0" cy="0"/>
+          <a:chOff x="0" y="0"/>
+          <a:chExt cx="0" cy="0"/>
+        </a:xfrm>
+      </p:grpSpPr>
+      <p:sp>
+        <p:nvSpPr>
+          <p:cNvPr id="13" name="Slide Number Placeholder 5"/>
+          <p:cNvSpPr>
+            <a:spLocks noGrp="1"/>
+          </p:cNvSpPr>
+          <p:nvPr>
+            <p:ph type="sldNum" sz="quarter" idx="12"/>
+          </p:nvPr>
+        </p:nvSpPr>
+        <p:spPr>
+          <a:xfrm>
+            <a:off x="4179770" y="6400800"/>
+            <a:ext cx="784460" cy="228600"/>
+          </a:xfrm>
+          <a:prstGeom prst="rect">
+            <a:avLst/>
+          </a:prstGeom>
+        </p:spPr>
+        <p:txBody>
+          <a:bodyPr lIns="0" tIns="0" rIns="0" bIns="0" anchor="b" anchorCtr="0"/>
+          <a:lstStyle>
+            <a:lvl1pPr algn="ctr">
+              <a:defRPr sz="1200">
+                <a:latin typeface="Open Sans" charset="0"/>
+                <a:ea typeface="Open Sans" charset="0"/>
+                <a:cs typeface="Open Sans" charset="0"/>
+              </a:defRPr>
+            </a:lvl1pPr>
+          </a:lstStyle>
+          <a:p>
+            <a:fld id="{29D81C1D-71AE-404E-8BFC-9F552A8A6EE1}" type="slidenum">
+              <a:rPr lang="en-US" smtClean="0"/>
+              <a:pPr/>
+              <a:t>‹#›</a:t>
+            </a:fld>
+            <a:endParaRPr lang="en-US" dirty="0"/>
+          </a:p>
+        </p:txBody>
+      </p:sp>
+      <p:cxnSp>
+        <p:nvCxnSpPr>
+          <p:cNvPr id="7" name="Straight Connector 6"/>
+          <p:cNvCxnSpPr/>
+          <p:nvPr userDrawn="1"/>
+        </p:nvCxnSpPr>
+        <p:spPr>
+          <a:xfrm>
+            <a:off x="685800" y="482600"/>
+            <a:ext cx="0" cy="274320"/>
+          </a:xfrm>
+          <a:prstGeom prst="line">
+            <a:avLst/>
+          </a:prstGeom>
+          <a:ln w="12700">
+            <a:solidFill>
+              <a:schemeClr val="accent5"/>
+            </a:solidFill>
+          </a:ln>
+        </p:spPr>
+        <p:style>
+          <a:lnRef idx="1">
+            <a:schemeClr val="accent1"/>
+          </a:lnRef>
+          <a:fillRef idx="0">
+            <a:schemeClr val="accent1"/>
+          </a:fillRef>
+          <a:effectRef idx="0">
+            <a:schemeClr val="accent1"/>
+          </a:effectRef>
+          <a:fontRef idx="minor">
+            <a:schemeClr val="tx1"/>
+          </a:fontRef>
+        </p:style>
+      </p:cxnSp>
+      <p:sp>
+        <p:nvSpPr>
+          <p:cNvPr id="9" name="Subtitle 2"/>
+          <p:cNvSpPr>
+            <a:spLocks noGrp="1"/>
+          </p:cNvSpPr>
+          <p:nvPr>
+            <p:ph type="subTitle" idx="1" hasCustomPrompt="1"/>
+          </p:nvPr>
+        </p:nvSpPr>
+        <p:spPr>
+          <a:xfrm>
+            <a:off x="685801" y="1193801"/>
+            <a:ext cx="2743200" cy="1473200"/>
+          </a:xfrm>
+          <a:prstGeom prst="rect">
+            <a:avLst/>
+          </a:prstGeom>
+        </p:spPr>
+        <p:txBody>
+          <a:bodyPr wrap="square" lIns="182880" rIns="182880" anchor="b" anchorCtr="0">
+            <a:normAutofit/>
+          </a:bodyPr>
+          <a:lstStyle>
+            <a:lvl1pPr marL="0" indent="0" algn="l">
+              <a:lnSpc>
+                <a:spcPct val="100000"/>
+              </a:lnSpc>
+              <a:buNone/>
+              <a:defRPr sz="4800" b="0" i="0" spc="-150" baseline="0">
+                <a:solidFill>
+                  <a:schemeClr val="accent1"/>
+                </a:solidFill>
+                <a:latin typeface="Source Serif Pro" charset="0"/>
+                <a:ea typeface="Source Serif Pro" charset="0"/>
+                <a:cs typeface="Source Serif Pro" charset="0"/>
+              </a:defRPr>
+            </a:lvl1pPr>
+            <a:lvl2pPr marL="457200" indent="0" algn="ctr">
+              <a:buNone/>
+              <a:defRPr sz="2000"/>
+            </a:lvl2pPr>
+            <a:lvl3pPr marL="914400" indent="0" algn="ctr">
+              <a:buNone/>
+              <a:defRPr sz="1800"/>
+            </a:lvl3pPr>
+            <a:lvl4pPr marL="1371600" indent="0" algn="ctr">
+              <a:buNone/>
+              <a:defRPr sz="1600"/>
+            </a:lvl4pPr>
+            <a:lvl5pPr marL="1828800" indent="0" algn="ctr">
+              <a:buNone/>
+              <a:defRPr sz="1600"/>
+            </a:lvl5pPr>
+            <a:lvl6pPr marL="2286000" indent="0" algn="ctr">
+              <a:buNone/>
+              <a:defRPr sz="1600"/>
+            </a:lvl6pPr>
+            <a:lvl7pPr marL="2743200" indent="0" algn="ctr">
+              <a:buNone/>
+              <a:defRPr sz="1600"/>
+            </a:lvl7pPr>
+            <a:lvl8pPr marL="3200400" indent="0" algn="ctr">
+              <a:buNone/>
+              <a:defRPr sz="1600"/>
+            </a:lvl8pPr>
+            <a:lvl9pPr marL="3657600" indent="0" algn="ctr">
+              <a:buNone/>
+              <a:defRPr sz="1600"/>
+            </a:lvl9pPr>
+          </a:lstStyle>
+          <a:p>
+            <a:r>
+              <a:rPr lang="en-US" dirty="0"/>
+              <a:t>Large media with text</a:t>
+            </a:r>
+          </a:p>
+        </p:txBody>
+      </p:sp>
+      <p:sp>
+        <p:nvSpPr>
+          <p:cNvPr id="8" name="Text Placeholder 2"/>
+          <p:cNvSpPr>
+            <a:spLocks noGrp="1"/>
+          </p:cNvSpPr>
+          <p:nvPr>
+            <p:ph type="body" sz="quarter" idx="13" hasCustomPrompt="1"/>
+          </p:nvPr>
+        </p:nvSpPr>
+        <p:spPr>
+          <a:xfrm>
+            <a:off x="692658" y="457200"/>
+            <a:ext cx="2955417" cy="338328"/>
+          </a:xfrm>
+          <a:prstGeom prst="rect">
+            <a:avLst/>
+          </a:prstGeom>
+        </p:spPr>
+        <p:txBody>
+          <a:bodyPr lIns="182880" rIns="182880" anchor="ctr" anchorCtr="0"/>
+          <a:lstStyle>
+            <a:lvl1pPr marL="0" indent="0">
+              <a:buNone/>
+              <a:defRPr sz="1600" b="0" i="0" baseline="0">
+                <a:solidFill>
+                  <a:schemeClr val="tx1"/>
+                </a:solidFill>
+                <a:latin typeface="Open Sans" charset="0"/>
+                <a:ea typeface="Open Sans" charset="0"/>
+                <a:cs typeface="Open Sans" charset="0"/>
+              </a:defRPr>
+            </a:lvl1pPr>
+          </a:lstStyle>
+          <a:p>
+            <a:pPr marL="228600" marR="0" lvl="0" indent="-228600" algn="l" defTabSz="914400" rtl="0" eaLnBrk="1" fontAlgn="auto" latinLnBrk="0" hangingPunct="1">
+              <a:lnSpc>
+                <a:spcPct val="90000"/>
+              </a:lnSpc>
+              <a:spcBef>
+                <a:spcPts val="1000"/>
+              </a:spcBef>
+              <a:spcAft>
+                <a:spcPts val="0"/>
+              </a:spcAft>
+              <a:buClrTx/>
+              <a:buSzTx/>
+              <a:tabLst/>
+              <a:defRPr/>
+            </a:pPr>
+            <a:r>
+              <a:rPr lang="en-US" dirty="0"/>
+              <a:t>Section Title</a:t>
+            </a:r>
+          </a:p>
+        </p:txBody>
+      </p:sp>
+      <p:sp>
+        <p:nvSpPr>
+          <p:cNvPr id="12" name="Text Placeholder 2"/>
+          <p:cNvSpPr>
+            <a:spLocks noGrp="1"/>
+          </p:cNvSpPr>
+          <p:nvPr>
+            <p:ph type="body" sz="quarter" idx="14" hasCustomPrompt="1"/>
+          </p:nvPr>
+        </p:nvSpPr>
+        <p:spPr>
+          <a:xfrm>
+            <a:off x="685800" y="2882900"/>
+            <a:ext cx="2743201" cy="2933700"/>
+          </a:xfrm>
+          <a:prstGeom prst="rect">
+            <a:avLst/>
+          </a:prstGeom>
+        </p:spPr>
+        <p:txBody>
+          <a:bodyPr lIns="182880" rIns="182880">
+            <a:normAutofit/>
+          </a:bodyPr>
+          <a:lstStyle>
+            <a:lvl1pPr marL="0" indent="0">
+              <a:lnSpc>
+                <a:spcPct val="140000"/>
+              </a:lnSpc>
+              <a:buNone/>
+              <a:defRPr sz="1800" b="0" i="0">
+                <a:latin typeface="Open Sans" charset="0"/>
+                <a:ea typeface="Open Sans" charset="0"/>
+                <a:cs typeface="Open Sans" charset="0"/>
+              </a:defRPr>
+            </a:lvl1pPr>
+          </a:lstStyle>
+          <a:p>
+            <a:r>
+              <a:rPr lang="en-US" dirty="0"/>
+              <a:t>Lorem ipsum dolor sit </a:t>
+            </a:r>
+            <a:r>
+              <a:rPr lang="en-US" dirty="0" err="1"/>
+              <a:t>amet</a:t>
+            </a:r>
+            <a:r>
+              <a:rPr lang="en-US" dirty="0"/>
+              <a:t>, </a:t>
+            </a:r>
+            <a:r>
+              <a:rPr lang="en-US" dirty="0" err="1"/>
+              <a:t>consectetur</a:t>
+            </a:r>
+            <a:r>
+              <a:rPr lang="en-US" dirty="0"/>
+              <a:t> </a:t>
+            </a:r>
+            <a:r>
+              <a:rPr lang="en-US" dirty="0" err="1"/>
+              <a:t>adipiscing</a:t>
+            </a:r>
+            <a:r>
+              <a:rPr lang="en-US" dirty="0"/>
+              <a:t> </a:t>
+            </a:r>
+            <a:r>
+              <a:rPr lang="en-US" dirty="0" err="1"/>
+              <a:t>elit</a:t>
+            </a:r>
+            <a:r>
+              <a:rPr lang="en-US" dirty="0"/>
+              <a:t>. </a:t>
+            </a:r>
+            <a:r>
+              <a:rPr lang="en-US" dirty="0" err="1"/>
+              <a:t>Ut</a:t>
+            </a:r>
+            <a:r>
+              <a:rPr lang="en-US" dirty="0"/>
+              <a:t> </a:t>
+            </a:r>
+            <a:r>
+              <a:rPr lang="en-US" dirty="0" err="1"/>
+              <a:t>sagittis</a:t>
+            </a:r>
+            <a:r>
+              <a:rPr lang="en-US" dirty="0"/>
+              <a:t> quam sit </a:t>
+            </a:r>
+            <a:r>
+              <a:rPr lang="en-US" dirty="0" err="1"/>
+              <a:t>amet</a:t>
+            </a:r>
+            <a:r>
+              <a:rPr lang="en-US" dirty="0"/>
+              <a:t> </a:t>
+            </a:r>
+            <a:r>
+              <a:rPr lang="en-US" dirty="0" err="1"/>
+              <a:t>consectetur</a:t>
+            </a:r>
+            <a:r>
+              <a:rPr lang="en-US" dirty="0"/>
+              <a:t> pharetra. Class </a:t>
+            </a:r>
+            <a:r>
+              <a:rPr lang="en-US" dirty="0" err="1"/>
+              <a:t>aptent</a:t>
+            </a:r>
+            <a:r>
+              <a:rPr lang="en-US" dirty="0"/>
+              <a:t> </a:t>
+            </a:r>
+            <a:r>
+              <a:rPr lang="en-US" dirty="0" err="1"/>
+              <a:t>taciti</a:t>
+            </a:r>
+            <a:r>
+              <a:rPr lang="en-US" dirty="0"/>
+              <a:t> </a:t>
+            </a:r>
+            <a:r>
+              <a:rPr lang="en-US" dirty="0" err="1"/>
+              <a:t>sociosqu</a:t>
+            </a:r>
+            <a:r>
+              <a:rPr lang="en-US" dirty="0"/>
+              <a:t> ad </a:t>
+            </a:r>
+            <a:r>
+              <a:rPr lang="en-US" dirty="0" err="1"/>
+              <a:t>litora</a:t>
+            </a:r>
+            <a:r>
+              <a:rPr lang="en-US" dirty="0"/>
+              <a:t> </a:t>
+            </a:r>
+            <a:r>
+              <a:rPr lang="en-US" dirty="0" err="1"/>
+              <a:t>torquent</a:t>
+            </a:r>
+            <a:r>
+              <a:rPr lang="en-US" dirty="0"/>
+              <a:t> per </a:t>
+            </a:r>
+            <a:r>
+              <a:rPr lang="en-US" dirty="0" err="1"/>
+              <a:t>conubia</a:t>
+            </a:r>
+            <a:r>
+              <a:rPr lang="en-US" dirty="0"/>
+              <a:t> nostra, per </a:t>
+            </a:r>
+            <a:r>
+              <a:rPr lang="en-US" dirty="0" err="1"/>
+              <a:t>inceptos</a:t>
+            </a:r>
+            <a:r>
+              <a:rPr lang="en-US" dirty="0"/>
+              <a:t> </a:t>
+            </a:r>
+            <a:r>
+              <a:rPr lang="en-US" dirty="0" err="1"/>
+              <a:t>himenaeos</a:t>
+            </a:r>
+            <a:r>
+              <a:rPr lang="en-US" dirty="0"/>
+              <a:t>. </a:t>
+            </a:r>
+            <a:endParaRPr lang="en-US" b="0" i="0" dirty="0">
+              <a:latin typeface="Open Sans" charset="0"/>
+              <a:ea typeface="Open Sans" charset="0"/>
+              <a:cs typeface="Open Sans" charset="0"/>
+            </a:endParaRPr>
+          </a:p>
+        </p:txBody>
+      </p:sp>
+      <p:sp>
+        <p:nvSpPr>
+          <p:cNvPr id="11" name="Content Placeholder 2"/>
+          <p:cNvSpPr>
+            <a:spLocks noGrp="1"/>
+          </p:cNvSpPr>
+          <p:nvPr>
+            <p:ph idx="15" hasCustomPrompt="1"/>
+          </p:nvPr>
+        </p:nvSpPr>
+        <p:spPr>
+          <a:xfrm>
+            <a:off x="3829050" y="256033"/>
+            <a:ext cx="5314950" cy="5577840"/>
+          </a:xfrm>
+          <a:prstGeom prst="rect">
+            <a:avLst/>
+          </a:prstGeom>
+        </p:spPr>
+        <p:txBody>
+          <a:bodyPr/>
+          <a:lstStyle>
+            <a:lvl1pPr>
+              <a:defRPr b="0" i="0">
+                <a:latin typeface="Open Sans" charset="0"/>
+                <a:ea typeface="Open Sans" charset="0"/>
+                <a:cs typeface="Open Sans" charset="0"/>
+              </a:defRPr>
+            </a:lvl1pPr>
+          </a:lstStyle>
+          <a:p>
+            <a:r>
+              <a:rPr lang="en-US" dirty="0"/>
+              <a:t>Click an icon below to add media</a:t>
+            </a:r>
+          </a:p>
+        </p:txBody>
+      </p:sp>
+    </p:spTree>
+    <p:extLst>
+      <p:ext uri="{BB962C8B-B14F-4D97-AF65-F5344CB8AC3E}">
+        <p14:creationId xmlns:p14="http://schemas.microsoft.com/office/powerpoint/2010/main" val="1492694626"/>
       </p:ext>
     </p:extLst>
   </p:cSld>
@@ -1906,7 +2460,7 @@
           <a:p>
             <a:fld id="{1DDC5609-1156-4F3C-8D48-AA76FA0D3182}" type="datetimeFigureOut">
               <a:rPr lang="en-GB" smtClean="0"/>
-              <a:t>27/11/2017</a:t>
+              <a:t>01/03/2018</a:t>
             </a:fld>
             <a:endParaRPr lang="en-GB" dirty="0"/>
           </a:p>
@@ -2152,7 +2706,7 @@
           <a:p>
             <a:fld id="{1DDC5609-1156-4F3C-8D48-AA76FA0D3182}" type="datetimeFigureOut">
               <a:rPr lang="en-GB" smtClean="0"/>
-              <a:t>27/11/2017</a:t>
+              <a:t>01/03/2018</a:t>
             </a:fld>
             <a:endParaRPr lang="en-GB" dirty="0"/>
           </a:p>
@@ -2440,7 +2994,7 @@
           <a:p>
             <a:fld id="{1DDC5609-1156-4F3C-8D48-AA76FA0D3182}" type="datetimeFigureOut">
               <a:rPr lang="en-GB" smtClean="0"/>
-              <a:t>27/11/2017</a:t>
+              <a:t>01/03/2018</a:t>
             </a:fld>
             <a:endParaRPr lang="en-GB" dirty="0"/>
           </a:p>
@@ -2862,7 +3416,7 @@
           <a:p>
             <a:fld id="{1DDC5609-1156-4F3C-8D48-AA76FA0D3182}" type="datetimeFigureOut">
               <a:rPr lang="en-GB" smtClean="0"/>
-              <a:t>27/11/2017</a:t>
+              <a:t>01/03/2018</a:t>
             </a:fld>
             <a:endParaRPr lang="en-GB" dirty="0"/>
           </a:p>
@@ -2980,7 +3534,7 @@
           <a:p>
             <a:fld id="{1DDC5609-1156-4F3C-8D48-AA76FA0D3182}" type="datetimeFigureOut">
               <a:rPr lang="en-GB" smtClean="0"/>
-              <a:t>27/11/2017</a:t>
+              <a:t>01/03/2018</a:t>
             </a:fld>
             <a:endParaRPr lang="en-GB" dirty="0"/>
           </a:p>
@@ -3075,7 +3629,7 @@
           <a:p>
             <a:fld id="{1DDC5609-1156-4F3C-8D48-AA76FA0D3182}" type="datetimeFigureOut">
               <a:rPr lang="en-GB" smtClean="0"/>
-              <a:t>27/11/2017</a:t>
+              <a:t>01/03/2018</a:t>
             </a:fld>
             <a:endParaRPr lang="en-GB" dirty="0"/>
           </a:p>
@@ -3352,7 +3906,7 @@
           <a:p>
             <a:fld id="{1DDC5609-1156-4F3C-8D48-AA76FA0D3182}" type="datetimeFigureOut">
               <a:rPr lang="en-GB" smtClean="0"/>
-              <a:t>27/11/2017</a:t>
+              <a:t>01/03/2018</a:t>
             </a:fld>
             <a:endParaRPr lang="en-GB" dirty="0"/>
           </a:p>
@@ -3605,7 +4159,7 @@
           <a:p>
             <a:fld id="{1DDC5609-1156-4F3C-8D48-AA76FA0D3182}" type="datetimeFigureOut">
               <a:rPr lang="en-GB" smtClean="0"/>
-              <a:t>27/11/2017</a:t>
+              <a:t>01/03/2018</a:t>
             </a:fld>
             <a:endParaRPr lang="en-GB" dirty="0"/>
           </a:p>
@@ -3780,16 +4334,12 @@
             <a:pPr lvl="4"/>
             <a:r>
               <a:rPr lang="en-US" dirty="0"/>
-              <a:t>Fifth </a:t>
-            </a:r>
-            <a:r>
-              <a:rPr lang="en-US" dirty="0" smtClean="0"/>
-              <a:t>level</a:t>
+              <a:t>Fifth level</a:t>
             </a:r>
           </a:p>
           <a:p>
             <a:pPr lvl="4"/>
-            <a:endParaRPr lang="en-US" dirty="0" smtClean="0"/>
+            <a:endParaRPr lang="en-US" dirty="0"/>
           </a:p>
         </p:txBody>
       </p:sp>
@@ -3828,7 +4378,7 @@
           <a:p>
             <a:fld id="{1DDC5609-1156-4F3C-8D48-AA76FA0D3182}" type="datetimeFigureOut">
               <a:rPr lang="en-GB" smtClean="0"/>
-              <a:t>27/11/2017</a:t>
+              <a:t>01/03/2018</a:t>
             </a:fld>
             <a:endParaRPr lang="en-GB" dirty="0"/>
           </a:p>
@@ -3932,14 +4482,8 @@
     <p:sldLayoutId id="2147483657" r:id="rId9"/>
     <p:sldLayoutId id="2147483658" r:id="rId10"/>
     <p:sldLayoutId id="2147483659" r:id="rId11"/>
+    <p:sldLayoutId id="2147483660" r:id="rId12"/>
   </p:sldLayoutIdLst>
-  <p:timing>
-    <p:tnLst>
-      <p:par>
-        <p:cTn id="1" dur="indefinite" restart="never" nodeType="tmRoot"/>
-      </p:par>
-    </p:tnLst>
-  </p:timing>
   <p:txStyles>
     <p:titleStyle>
       <a:lvl1pPr algn="ctr" defTabSz="914400" rtl="0" eaLnBrk="1" latinLnBrk="0" hangingPunct="1">
@@ -4210,6 +4754,462 @@
           <a:chExt cx="0" cy="0"/>
         </a:xfrm>
       </p:grpSpPr>
+      <p:sp>
+        <p:nvSpPr>
+          <p:cNvPr id="3" name="Subtitle 2"/>
+          <p:cNvSpPr>
+            <a:spLocks noGrp="1"/>
+          </p:cNvSpPr>
+          <p:nvPr>
+            <p:ph type="subTitle" idx="1"/>
+          </p:nvPr>
+        </p:nvSpPr>
+        <p:spPr>
+          <a:xfrm>
+            <a:off x="683568" y="-459432"/>
+            <a:ext cx="5470375" cy="1473200"/>
+          </a:xfrm>
+        </p:spPr>
+        <p:txBody>
+          <a:bodyPr/>
+          <a:lstStyle/>
+          <a:p>
+            <a:r>
+              <a:rPr lang="en-US" dirty="0">
+                <a:solidFill>
+                  <a:schemeClr val="accent5">
+                    <a:lumMod val="75000"/>
+                  </a:schemeClr>
+                </a:solidFill>
+              </a:rPr>
+              <a:t>Researcher Tools Map</a:t>
+            </a:r>
+          </a:p>
+        </p:txBody>
+      </p:sp>
+      <p:sp>
+        <p:nvSpPr>
+          <p:cNvPr id="5" name="Text Placeholder 4"/>
+          <p:cNvSpPr>
+            <a:spLocks noGrp="1"/>
+          </p:cNvSpPr>
+          <p:nvPr>
+            <p:ph type="body" sz="quarter" idx="14"/>
+          </p:nvPr>
+        </p:nvSpPr>
+        <p:spPr>
+          <a:xfrm>
+            <a:off x="683568" y="1412776"/>
+            <a:ext cx="7056784" cy="3960440"/>
+          </a:xfrm>
+        </p:spPr>
+        <p:txBody>
+          <a:bodyPr>
+            <a:noAutofit/>
+          </a:bodyPr>
+          <a:lstStyle/>
+          <a:p>
+            <a:pPr>
+              <a:lnSpc>
+                <a:spcPct val="115000"/>
+              </a:lnSpc>
+              <a:spcBef>
+                <a:spcPts val="0"/>
+              </a:spcBef>
+            </a:pPr>
+            <a:r>
+              <a:rPr lang="en-US" sz="1400" dirty="0">
+                <a:latin typeface="Open Sans" panose="020B0606030504020204" pitchFamily="34" charset="0"/>
+                <a:ea typeface="Open Sans" panose="020B0606030504020204" pitchFamily="34" charset="0"/>
+                <a:cs typeface="Open Sans" panose="020B0606030504020204" pitchFamily="34" charset="0"/>
+              </a:rPr>
+              <a:t>Author Marketing has created </a:t>
+            </a:r>
+            <a:r>
+              <a:rPr lang="en-US" sz="1400" u="sng" dirty="0">
+                <a:hlinkClick r:id="rId2"/>
+              </a:rPr>
+              <a:t>a set of maps</a:t>
+            </a:r>
+            <a:r>
+              <a:rPr lang="en-US" sz="1400" dirty="0">
+                <a:latin typeface="Open Sans" panose="020B0606030504020204" pitchFamily="34" charset="0"/>
+                <a:ea typeface="Open Sans" panose="020B0606030504020204" pitchFamily="34" charset="0"/>
+                <a:cs typeface="Open Sans" panose="020B0606030504020204" pitchFamily="34" charset="0"/>
+              </a:rPr>
+              <a:t> </a:t>
+            </a:r>
+            <a:r>
+              <a:rPr lang="en-GB" sz="1400" i="1" dirty="0">
+                <a:latin typeface="Open Sans" panose="020B0606030504020204" pitchFamily="34" charset="0"/>
+                <a:ea typeface="Open Sans" panose="020B0606030504020204" pitchFamily="34" charset="0"/>
+                <a:cs typeface="Open Sans" panose="020B0606030504020204" pitchFamily="34" charset="0"/>
+              </a:rPr>
+              <a:t>(username: </a:t>
+            </a:r>
+            <a:r>
+              <a:rPr lang="en-GB" sz="1400" i="1" dirty="0" err="1">
+                <a:latin typeface="Open Sans" panose="020B0606030504020204" pitchFamily="34" charset="0"/>
+                <a:ea typeface="Open Sans" panose="020B0606030504020204" pitchFamily="34" charset="0"/>
+                <a:cs typeface="Open Sans" panose="020B0606030504020204" pitchFamily="34" charset="0"/>
+              </a:rPr>
+              <a:t>authorservices</a:t>
+            </a:r>
+            <a:r>
+              <a:rPr lang="en-GB" sz="1400" i="1" dirty="0">
+                <a:latin typeface="Open Sans" panose="020B0606030504020204" pitchFamily="34" charset="0"/>
+                <a:ea typeface="Open Sans" panose="020B0606030504020204" pitchFamily="34" charset="0"/>
+                <a:cs typeface="Open Sans" panose="020B0606030504020204" pitchFamily="34" charset="0"/>
+              </a:rPr>
+              <a:t>; password: wiley1) </a:t>
+            </a:r>
+            <a:r>
+              <a:rPr lang="en-US" sz="1400" dirty="0">
+                <a:latin typeface="Open Sans" panose="020B0606030504020204" pitchFamily="34" charset="0"/>
+                <a:ea typeface="Open Sans" panose="020B0606030504020204" pitchFamily="34" charset="0"/>
+                <a:cs typeface="Open Sans" panose="020B0606030504020204" pitchFamily="34" charset="0"/>
+              </a:rPr>
+              <a:t>showing the various tools and services that Wiley offers researchers across the research journey—from discovery through to publication and beyond. </a:t>
+            </a:r>
+          </a:p>
+          <a:p>
+            <a:pPr>
+              <a:lnSpc>
+                <a:spcPct val="115000"/>
+              </a:lnSpc>
+              <a:spcBef>
+                <a:spcPts val="0"/>
+              </a:spcBef>
+            </a:pPr>
+            <a:r>
+              <a:rPr lang="en-US" sz="1400" dirty="0">
+                <a:latin typeface="Open Sans" panose="020B0606030504020204" pitchFamily="34" charset="0"/>
+                <a:ea typeface="Open Sans" panose="020B0606030504020204" pitchFamily="34" charset="0"/>
+                <a:cs typeface="Open Sans" panose="020B0606030504020204" pitchFamily="34" charset="0"/>
+              </a:rPr>
+              <a:t> </a:t>
+            </a:r>
+          </a:p>
+          <a:p>
+            <a:pPr>
+              <a:lnSpc>
+                <a:spcPct val="115000"/>
+              </a:lnSpc>
+              <a:spcBef>
+                <a:spcPts val="0"/>
+              </a:spcBef>
+            </a:pPr>
+            <a:r>
+              <a:rPr lang="en-US" sz="1400" dirty="0">
+                <a:latin typeface="Open Sans" panose="020B0606030504020204" pitchFamily="34" charset="0"/>
+                <a:ea typeface="Open Sans" panose="020B0606030504020204" pitchFamily="34" charset="0"/>
+                <a:cs typeface="Open Sans" panose="020B0606030504020204" pitchFamily="34" charset="0"/>
+              </a:rPr>
+              <a:t>The main resource is an </a:t>
+            </a:r>
+            <a:r>
+              <a:rPr lang="en-US" sz="1400" b="1" dirty="0">
+                <a:latin typeface="Open Sans" panose="020B0606030504020204" pitchFamily="34" charset="0"/>
+                <a:ea typeface="Open Sans" panose="020B0606030504020204" pitchFamily="34" charset="0"/>
+                <a:cs typeface="Open Sans" panose="020B0606030504020204" pitchFamily="34" charset="0"/>
+              </a:rPr>
+              <a:t>internal only</a:t>
+            </a:r>
+            <a:r>
+              <a:rPr lang="en-US" sz="1400" dirty="0">
+                <a:latin typeface="Open Sans" panose="020B0606030504020204" pitchFamily="34" charset="0"/>
+                <a:ea typeface="Open Sans" panose="020B0606030504020204" pitchFamily="34" charset="0"/>
+                <a:cs typeface="Open Sans" panose="020B0606030504020204" pitchFamily="34" charset="0"/>
+              </a:rPr>
+              <a:t> </a:t>
+            </a:r>
+            <a:r>
+              <a:rPr lang="en-US" sz="1400" u="sng" dirty="0">
+                <a:solidFill>
+                  <a:srgbClr val="0000FF"/>
+                </a:solidFill>
+                <a:latin typeface="Open Sans" panose="020B0606030504020204" pitchFamily="34" charset="0"/>
+                <a:ea typeface="Open Sans" panose="020B0606030504020204" pitchFamily="34" charset="0"/>
+                <a:cs typeface="Open Sans" panose="020B0606030504020204" pitchFamily="34" charset="0"/>
+                <a:hlinkClick r:id="rId3"/>
+              </a:rPr>
+              <a:t>Interactive Map</a:t>
+            </a:r>
+            <a:r>
+              <a:rPr lang="en-US" sz="1400">
+                <a:latin typeface="Open Sans" panose="020B0606030504020204" pitchFamily="34" charset="0"/>
+                <a:ea typeface="Open Sans" panose="020B0606030504020204" pitchFamily="34" charset="0"/>
+                <a:cs typeface="Open Sans" panose="020B0606030504020204" pitchFamily="34" charset="0"/>
+              </a:rPr>
+              <a:t> which </a:t>
+            </a:r>
+            <a:r>
+              <a:rPr lang="en-US" sz="1400" dirty="0">
+                <a:latin typeface="Open Sans" panose="020B0606030504020204" pitchFamily="34" charset="0"/>
+                <a:ea typeface="Open Sans" panose="020B0606030504020204" pitchFamily="34" charset="0"/>
+                <a:cs typeface="Open Sans" panose="020B0606030504020204" pitchFamily="34" charset="0"/>
+              </a:rPr>
+              <a:t>allows you to click through each stage of the author journey and see the associated Wiley products, services, or policies, including a brief description and a link to the accompanying external site for that product. </a:t>
+            </a:r>
+          </a:p>
+          <a:p>
+            <a:pPr>
+              <a:lnSpc>
+                <a:spcPct val="115000"/>
+              </a:lnSpc>
+              <a:spcBef>
+                <a:spcPts val="0"/>
+              </a:spcBef>
+            </a:pPr>
+            <a:r>
+              <a:rPr lang="en-US" sz="1400" dirty="0">
+                <a:latin typeface="Open Sans" panose="020B0606030504020204" pitchFamily="34" charset="0"/>
+                <a:ea typeface="Open Sans" panose="020B0606030504020204" pitchFamily="34" charset="0"/>
+                <a:cs typeface="Open Sans" panose="020B0606030504020204" pitchFamily="34" charset="0"/>
+              </a:rPr>
+              <a:t> </a:t>
+            </a:r>
+          </a:p>
+          <a:p>
+            <a:pPr>
+              <a:lnSpc>
+                <a:spcPct val="115000"/>
+              </a:lnSpc>
+              <a:spcBef>
+                <a:spcPts val="0"/>
+              </a:spcBef>
+            </a:pPr>
+            <a:r>
+              <a:rPr lang="en-US" sz="1400" b="1" dirty="0">
+                <a:latin typeface="Open Sans" panose="020B0606030504020204" pitchFamily="34" charset="0"/>
+                <a:ea typeface="Open Sans" panose="020B0606030504020204" pitchFamily="34" charset="0"/>
+                <a:cs typeface="Open Sans" panose="020B0606030504020204" pitchFamily="34" charset="0"/>
+              </a:rPr>
+              <a:t>We’ve created this static PowerPoint Summary that you are welcome to download and use for external presentations or to save as a PDF and send to your clients as appropriate (delete this slide before sharing). </a:t>
+            </a:r>
+            <a:r>
+              <a:rPr lang="en-US" sz="1400" dirty="0">
+                <a:latin typeface="Open Sans" panose="020B0606030504020204" pitchFamily="34" charset="0"/>
+                <a:ea typeface="Open Sans" panose="020B0606030504020204" pitchFamily="34" charset="0"/>
+                <a:cs typeface="Open Sans" panose="020B0606030504020204" pitchFamily="34" charset="0"/>
+              </a:rPr>
+              <a:t>The icons for each tool or service include a link to an external facing site, where available. </a:t>
+            </a:r>
+          </a:p>
+        </p:txBody>
+      </p:sp>
+      <p:sp>
+        <p:nvSpPr>
+          <p:cNvPr id="11" name="Text Placeholder 4">
+            <a:extLst>
+              <a:ext uri="{FF2B5EF4-FFF2-40B4-BE49-F238E27FC236}">
+                <a16:creationId xmlns:a16="http://schemas.microsoft.com/office/drawing/2014/main" id="{D729D2A0-7B79-48C4-AE8D-DF017CBF2472}"/>
+              </a:ext>
+            </a:extLst>
+          </p:cNvPr>
+          <p:cNvSpPr txBox="1">
+            <a:spLocks/>
+          </p:cNvSpPr>
+          <p:nvPr/>
+        </p:nvSpPr>
+        <p:spPr>
+          <a:xfrm>
+            <a:off x="5292080" y="6453336"/>
+            <a:ext cx="5904656" cy="546100"/>
+          </a:xfrm>
+          <a:prstGeom prst="rect">
+            <a:avLst/>
+          </a:prstGeom>
+        </p:spPr>
+        <p:txBody>
+          <a:bodyPr vert="horz" lIns="182880" tIns="45720" rIns="182880" bIns="45720" rtlCol="0">
+            <a:normAutofit/>
+          </a:bodyPr>
+          <a:lstStyle>
+            <a:lvl1pPr marL="0" indent="0" algn="l" defTabSz="914400" rtl="0" eaLnBrk="1" latinLnBrk="0" hangingPunct="1">
+              <a:lnSpc>
+                <a:spcPct val="140000"/>
+              </a:lnSpc>
+              <a:spcBef>
+                <a:spcPct val="20000"/>
+              </a:spcBef>
+              <a:buFont typeface="Arial" panose="020B0604020202020204" pitchFamily="34" charset="0"/>
+              <a:buNone/>
+              <a:defRPr sz="1800" b="0" i="0" kern="1200">
+                <a:solidFill>
+                  <a:schemeClr val="tx1"/>
+                </a:solidFill>
+                <a:latin typeface="Open Sans" charset="0"/>
+                <a:ea typeface="Open Sans" charset="0"/>
+                <a:cs typeface="Open Sans" charset="0"/>
+              </a:defRPr>
+            </a:lvl1pPr>
+            <a:lvl2pPr marL="742950" indent="-285750" algn="l" defTabSz="914400" rtl="0" eaLnBrk="1" latinLnBrk="0" hangingPunct="1">
+              <a:spcBef>
+                <a:spcPct val="20000"/>
+              </a:spcBef>
+              <a:buFont typeface="Arial" panose="020B0604020202020204" pitchFamily="34" charset="0"/>
+              <a:buChar char="–"/>
+              <a:defRPr sz="2800" kern="1200">
+                <a:solidFill>
+                  <a:schemeClr val="tx1"/>
+                </a:solidFill>
+                <a:latin typeface="+mn-lt"/>
+                <a:ea typeface="+mn-ea"/>
+                <a:cs typeface="+mn-cs"/>
+              </a:defRPr>
+            </a:lvl2pPr>
+            <a:lvl3pPr marL="1143000" indent="-228600" algn="l" defTabSz="914400" rtl="0" eaLnBrk="1" latinLnBrk="0" hangingPunct="1">
+              <a:spcBef>
+                <a:spcPct val="20000"/>
+              </a:spcBef>
+              <a:buFont typeface="Arial" panose="020B0604020202020204" pitchFamily="34" charset="0"/>
+              <a:buChar char="•"/>
+              <a:defRPr sz="2400" kern="1200">
+                <a:solidFill>
+                  <a:schemeClr val="tx1"/>
+                </a:solidFill>
+                <a:latin typeface="+mn-lt"/>
+                <a:ea typeface="+mn-ea"/>
+                <a:cs typeface="+mn-cs"/>
+              </a:defRPr>
+            </a:lvl3pPr>
+            <a:lvl4pPr marL="1600200" indent="-228600" algn="l" defTabSz="914400" rtl="0" eaLnBrk="1" latinLnBrk="0" hangingPunct="1">
+              <a:spcBef>
+                <a:spcPct val="20000"/>
+              </a:spcBef>
+              <a:buFont typeface="Arial" panose="020B0604020202020204" pitchFamily="34" charset="0"/>
+              <a:buChar char="–"/>
+              <a:defRPr sz="2000" kern="1200">
+                <a:solidFill>
+                  <a:schemeClr val="tx1"/>
+                </a:solidFill>
+                <a:latin typeface="+mn-lt"/>
+                <a:ea typeface="+mn-ea"/>
+                <a:cs typeface="+mn-cs"/>
+              </a:defRPr>
+            </a:lvl4pPr>
+            <a:lvl5pPr marL="1828800" indent="0" algn="l" defTabSz="914400" rtl="0" eaLnBrk="1" latinLnBrk="0" hangingPunct="1">
+              <a:spcBef>
+                <a:spcPct val="20000"/>
+              </a:spcBef>
+              <a:buFont typeface="Arial" panose="020B0604020202020204" pitchFamily="34" charset="0"/>
+              <a:buNone/>
+              <a:defRPr sz="2000" kern="1200" baseline="0">
+                <a:solidFill>
+                  <a:schemeClr val="tx1"/>
+                </a:solidFill>
+                <a:latin typeface="+mn-lt"/>
+                <a:ea typeface="+mn-ea"/>
+                <a:cs typeface="+mn-cs"/>
+              </a:defRPr>
+            </a:lvl5pPr>
+            <a:lvl6pPr marL="2514600" indent="-228600" algn="l" defTabSz="914400" rtl="0" eaLnBrk="1" latinLnBrk="0" hangingPunct="1">
+              <a:spcBef>
+                <a:spcPct val="20000"/>
+              </a:spcBef>
+              <a:buFont typeface="Arial" panose="020B0604020202020204" pitchFamily="34" charset="0"/>
+              <a:buChar char="•"/>
+              <a:defRPr sz="2000" kern="1200">
+                <a:solidFill>
+                  <a:schemeClr val="tx1"/>
+                </a:solidFill>
+                <a:latin typeface="+mn-lt"/>
+                <a:ea typeface="+mn-ea"/>
+                <a:cs typeface="+mn-cs"/>
+              </a:defRPr>
+            </a:lvl6pPr>
+            <a:lvl7pPr marL="2971800" indent="-228600" algn="l" defTabSz="914400" rtl="0" eaLnBrk="1" latinLnBrk="0" hangingPunct="1">
+              <a:spcBef>
+                <a:spcPct val="20000"/>
+              </a:spcBef>
+              <a:buFont typeface="Arial" panose="020B0604020202020204" pitchFamily="34" charset="0"/>
+              <a:buChar char="•"/>
+              <a:defRPr sz="2000" kern="1200">
+                <a:solidFill>
+                  <a:schemeClr val="tx1"/>
+                </a:solidFill>
+                <a:latin typeface="+mn-lt"/>
+                <a:ea typeface="+mn-ea"/>
+                <a:cs typeface="+mn-cs"/>
+              </a:defRPr>
+            </a:lvl7pPr>
+            <a:lvl8pPr marL="3429000" indent="-228600" algn="l" defTabSz="914400" rtl="0" eaLnBrk="1" latinLnBrk="0" hangingPunct="1">
+              <a:spcBef>
+                <a:spcPct val="20000"/>
+              </a:spcBef>
+              <a:buFont typeface="Arial" panose="020B0604020202020204" pitchFamily="34" charset="0"/>
+              <a:buChar char="•"/>
+              <a:defRPr sz="2000" kern="1200">
+                <a:solidFill>
+                  <a:schemeClr val="tx1"/>
+                </a:solidFill>
+                <a:latin typeface="+mn-lt"/>
+                <a:ea typeface="+mn-ea"/>
+                <a:cs typeface="+mn-cs"/>
+              </a:defRPr>
+            </a:lvl8pPr>
+            <a:lvl9pPr marL="3886200" indent="-228600" algn="l" defTabSz="914400" rtl="0" eaLnBrk="1" latinLnBrk="0" hangingPunct="1">
+              <a:spcBef>
+                <a:spcPct val="20000"/>
+              </a:spcBef>
+              <a:buFont typeface="Arial" panose="020B0604020202020204" pitchFamily="34" charset="0"/>
+              <a:buChar char="•"/>
+              <a:defRPr sz="2000" kern="1200">
+                <a:solidFill>
+                  <a:schemeClr val="tx1"/>
+                </a:solidFill>
+                <a:latin typeface="+mn-lt"/>
+                <a:ea typeface="+mn-ea"/>
+                <a:cs typeface="+mn-cs"/>
+              </a:defRPr>
+            </a:lvl9pPr>
+          </a:lstStyle>
+          <a:p>
+            <a:r>
+              <a:rPr lang="en-US" sz="1200" dirty="0"/>
+              <a:t>Questions or feedback? Contact </a:t>
+            </a:r>
+            <a:r>
+              <a:rPr lang="en-US" sz="1200" dirty="0">
+                <a:hlinkClick r:id="rId4"/>
+              </a:rPr>
+              <a:t>Elizabeth Matson</a:t>
+            </a:r>
+            <a:endParaRPr lang="en-US" sz="1200" dirty="0"/>
+          </a:p>
+        </p:txBody>
+      </p:sp>
+    </p:spTree>
+    <p:extLst>
+      <p:ext uri="{BB962C8B-B14F-4D97-AF65-F5344CB8AC3E}">
+        <p14:creationId xmlns:p14="http://schemas.microsoft.com/office/powerpoint/2010/main" val="3979571508"/>
+      </p:ext>
+    </p:extLst>
+  </p:cSld>
+  <p:clrMapOvr>
+    <a:masterClrMapping/>
+  </p:clrMapOvr>
+</p:sld>
+</file>
+
+<file path=ppt/slides/slide2.xml><?xml version="1.0" encoding="utf-8"?>
+<p:sld xmlns:a="http://schemas.openxmlformats.org/drawingml/2006/main" xmlns:r="http://schemas.openxmlformats.org/officeDocument/2006/relationships" xmlns:p="http://schemas.openxmlformats.org/presentationml/2006/main">
+  <p:cSld>
+    <p:spTree>
+      <p:nvGrpSpPr>
+        <p:cNvPr id="1" name=""/>
+        <p:cNvGrpSpPr/>
+        <p:nvPr/>
+      </p:nvGrpSpPr>
+      <p:grpSpPr>
+        <a:xfrm>
+          <a:off x="0" y="0"/>
+          <a:ext cx="0" cy="0"/>
+          <a:chOff x="0" y="0"/>
+          <a:chExt cx="0" cy="0"/>
+        </a:xfrm>
+      </p:grpSpPr>
       <p:cxnSp>
         <p:nvCxnSpPr>
           <p:cNvPr id="115" name="Straight Connector 114"/>
@@ -4410,83 +5410,6 @@
               <a:latin typeface="Open Sans Semibold" panose="020B0706030804020204" pitchFamily="34" charset="0"/>
               <a:ea typeface="Open Sans Semibold" panose="020B0706030804020204" pitchFamily="34" charset="0"/>
               <a:cs typeface="Open Sans Semibold" panose="020B0706030804020204" pitchFamily="34" charset="0"/>
-            </a:endParaRPr>
-          </a:p>
-        </p:txBody>
-      </p:sp>
-      <p:sp>
-        <p:nvSpPr>
-          <p:cNvPr id="2" name="Oval 1">
-            <a:hlinkClick r:id="rId3"/>
-          </p:cNvPr>
-          <p:cNvSpPr/>
-          <p:nvPr/>
-        </p:nvSpPr>
-        <p:spPr>
-          <a:xfrm>
-            <a:off x="4152195" y="309047"/>
-            <a:ext cx="720080" cy="720080"/>
-          </a:xfrm>
-          <a:prstGeom prst="ellipse">
-            <a:avLst/>
-          </a:prstGeom>
-          <a:solidFill>
-            <a:srgbClr val="00A3B2"/>
-          </a:solidFill>
-          <a:ln>
-            <a:noFill/>
-          </a:ln>
-        </p:spPr>
-        <p:style>
-          <a:lnRef idx="2">
-            <a:schemeClr val="accent1">
-              <a:shade val="50000"/>
-            </a:schemeClr>
-          </a:lnRef>
-          <a:fillRef idx="1">
-            <a:schemeClr val="accent1"/>
-          </a:fillRef>
-          <a:effectRef idx="0">
-            <a:schemeClr val="accent1"/>
-          </a:effectRef>
-          <a:fontRef idx="minor">
-            <a:schemeClr val="lt1"/>
-          </a:fontRef>
-        </p:style>
-        <p:txBody>
-          <a:bodyPr wrap="none" lIns="0" tIns="0" rIns="0" bIns="0" rtlCol="0" anchor="ctr">
-            <a:normAutofit/>
-          </a:bodyPr>
-          <a:lstStyle/>
-          <a:p>
-            <a:pPr algn="ctr"/>
-            <a:r>
-              <a:rPr lang="en-GB" sz="800" dirty="0">
-                <a:latin typeface="Open Sans" panose="020B0606030504020204" pitchFamily="34" charset="0"/>
-                <a:ea typeface="Open Sans" panose="020B0606030504020204" pitchFamily="34" charset="0"/>
-                <a:cs typeface="Open Sans" panose="020B0606030504020204" pitchFamily="34" charset="0"/>
-              </a:rPr>
-              <a:t> Wiley</a:t>
-            </a:r>
-            <a:br>
-              <a:rPr lang="en-GB" sz="800" dirty="0">
-                <a:latin typeface="Open Sans" panose="020B0606030504020204" pitchFamily="34" charset="0"/>
-                <a:ea typeface="Open Sans" panose="020B0606030504020204" pitchFamily="34" charset="0"/>
-                <a:cs typeface="Open Sans" panose="020B0606030504020204" pitchFamily="34" charset="0"/>
-              </a:rPr>
-            </a:br>
-            <a:r>
-              <a:rPr lang="en-GB" sz="800" dirty="0" smtClean="0">
-                <a:latin typeface="Open Sans" panose="020B0606030504020204" pitchFamily="34" charset="0"/>
-                <a:ea typeface="Open Sans" panose="020B0606030504020204" pitchFamily="34" charset="0"/>
-                <a:cs typeface="Open Sans" panose="020B0606030504020204" pitchFamily="34" charset="0"/>
-              </a:rPr>
-              <a:t>ChemPlanner</a:t>
-            </a:r>
-            <a:endParaRPr lang="en-GB" sz="800" dirty="0">
-              <a:latin typeface="Open Sans" panose="020B0606030504020204" pitchFamily="34" charset="0"/>
-              <a:ea typeface="Open Sans" panose="020B0606030504020204" pitchFamily="34" charset="0"/>
-              <a:cs typeface="Open Sans" panose="020B0606030504020204" pitchFamily="34" charset="0"/>
             </a:endParaRPr>
           </a:p>
         </p:txBody>
@@ -4520,7 +5443,7 @@
               <a:avLst/>
             </a:prstGeom>
             <a:blipFill dpi="0" rotWithShape="0">
-              <a:blip r:embed="rId4"/>
+              <a:blip r:embed="rId3"/>
               <a:srcRect/>
               <a:stretch>
                 <a:fillRect/>
@@ -4632,7 +5555,7 @@
       <p:sp>
         <p:nvSpPr>
           <p:cNvPr id="9" name="Oval 8">
-            <a:hlinkClick r:id="rId5"/>
+            <a:hlinkClick r:id="rId4"/>
           </p:cNvPr>
           <p:cNvSpPr/>
           <p:nvPr/>
@@ -4745,7 +5668,7 @@
               <a:avLst/>
             </a:prstGeom>
             <a:blipFill dpi="0" rotWithShape="0">
-              <a:blip r:embed="rId6"/>
+              <a:blip r:embed="rId5"/>
               <a:srcRect/>
               <a:stretch>
                 <a:fillRect/>
@@ -4883,7 +5806,7 @@
               <a:avLst/>
             </a:prstGeom>
             <a:blipFill dpi="0" rotWithShape="0">
-              <a:blip r:embed="rId7"/>
+              <a:blip r:embed="rId6"/>
               <a:srcRect/>
               <a:stretch>
                 <a:fillRect/>
@@ -5021,7 +5944,7 @@
               <a:avLst/>
             </a:prstGeom>
             <a:blipFill dpi="0" rotWithShape="0">
-              <a:blip r:embed="rId8"/>
+              <a:blip r:embed="rId7"/>
               <a:srcRect/>
               <a:stretch>
                 <a:fillRect/>
@@ -5159,7 +6082,7 @@
               <a:avLst/>
             </a:prstGeom>
             <a:blipFill dpi="0" rotWithShape="0">
-              <a:blip r:embed="rId9"/>
+              <a:blip r:embed="rId8"/>
               <a:srcRect/>
               <a:stretch>
                 <a:fillRect/>
@@ -5297,7 +6220,7 @@
               <a:avLst/>
             </a:prstGeom>
             <a:blipFill dpi="0" rotWithShape="0">
-              <a:blip r:embed="rId10"/>
+              <a:blip r:embed="rId9"/>
               <a:srcRect/>
               <a:stretch>
                 <a:fillRect/>
@@ -5468,7 +6391,7 @@
               <a:avLst/>
             </a:prstGeom>
             <a:blipFill dpi="0" rotWithShape="0">
-              <a:blip r:embed="rId11"/>
+              <a:blip r:embed="rId10"/>
               <a:srcRect/>
               <a:stretch>
                 <a:fillRect/>
@@ -5580,7 +6503,7 @@
       <p:sp>
         <p:nvSpPr>
           <p:cNvPr id="35" name="Oval 34">
-            <a:hlinkClick r:id="rId12"/>
+            <a:hlinkClick r:id="rId11"/>
           </p:cNvPr>
           <p:cNvSpPr/>
           <p:nvPr/>
@@ -5637,7 +6560,7 @@
       <p:sp>
         <p:nvSpPr>
           <p:cNvPr id="38" name="Oval 37">
-            <a:hlinkClick r:id="rId13"/>
+            <a:hlinkClick r:id="rId12"/>
           </p:cNvPr>
           <p:cNvSpPr/>
           <p:nvPr/>
@@ -5794,7 +6717,7 @@
       <p:sp>
         <p:nvSpPr>
           <p:cNvPr id="40" name="Oval 39">
-            <a:hlinkClick r:id="rId14"/>
+            <a:hlinkClick r:id="rId13"/>
           </p:cNvPr>
           <p:cNvSpPr/>
           <p:nvPr/>
@@ -5866,7 +6789,7 @@
       <p:sp>
         <p:nvSpPr>
           <p:cNvPr id="41" name="Oval 40">
-            <a:hlinkClick r:id="rId15"/>
+            <a:hlinkClick r:id="rId14"/>
           </p:cNvPr>
           <p:cNvSpPr/>
           <p:nvPr/>
@@ -5953,7 +6876,7 @@
       <p:sp>
         <p:nvSpPr>
           <p:cNvPr id="42" name="Oval 41">
-            <a:hlinkClick r:id="rId16"/>
+            <a:hlinkClick r:id="rId15"/>
           </p:cNvPr>
           <p:cNvSpPr/>
           <p:nvPr/>
@@ -6110,7 +7033,7 @@
       <p:sp>
         <p:nvSpPr>
           <p:cNvPr id="44" name="Oval 43">
-            <a:hlinkClick r:id="rId17"/>
+            <a:hlinkClick r:id="rId16"/>
           </p:cNvPr>
           <p:cNvSpPr/>
           <p:nvPr/>
@@ -6282,7 +7205,7 @@
       <p:sp>
         <p:nvSpPr>
           <p:cNvPr id="50" name="Oval 49">
-            <a:hlinkClick r:id="rId18"/>
+            <a:hlinkClick r:id="rId17"/>
           </p:cNvPr>
           <p:cNvSpPr/>
           <p:nvPr/>
@@ -6369,7 +7292,7 @@
       <p:sp>
         <p:nvSpPr>
           <p:cNvPr id="51" name="Oval 50">
-            <a:hlinkClick r:id="rId14"/>
+            <a:hlinkClick r:id="rId13"/>
           </p:cNvPr>
           <p:cNvSpPr/>
           <p:nvPr/>
@@ -6526,7 +7449,7 @@
       <p:sp>
         <p:nvSpPr>
           <p:cNvPr id="54" name="Oval 53">
-            <a:hlinkClick r:id="rId19"/>
+            <a:hlinkClick r:id="rId18"/>
           </p:cNvPr>
           <p:cNvSpPr/>
           <p:nvPr/>
@@ -6753,7 +7676,7 @@
       <p:sp>
         <p:nvSpPr>
           <p:cNvPr id="58" name="Oval 57">
-            <a:hlinkClick r:id="rId20"/>
+            <a:hlinkClick r:id="rId19"/>
           </p:cNvPr>
           <p:cNvSpPr/>
           <p:nvPr/>
@@ -6825,7 +7748,7 @@
       <p:sp>
         <p:nvSpPr>
           <p:cNvPr id="59" name="Oval 58">
-            <a:hlinkClick r:id="rId21"/>
+            <a:hlinkClick r:id="rId20"/>
           </p:cNvPr>
           <p:cNvSpPr/>
           <p:nvPr/>
@@ -6897,7 +7820,7 @@
       <p:sp>
         <p:nvSpPr>
           <p:cNvPr id="60" name="Oval 59">
-            <a:hlinkClick r:id="rId22"/>
+            <a:hlinkClick r:id="rId21"/>
           </p:cNvPr>
           <p:cNvSpPr/>
           <p:nvPr/>
@@ -6984,7 +7907,7 @@
       <p:sp>
         <p:nvSpPr>
           <p:cNvPr id="61" name="Oval 60">
-            <a:hlinkClick r:id="rId23"/>
+            <a:hlinkClick r:id="rId22"/>
           </p:cNvPr>
           <p:cNvSpPr/>
           <p:nvPr/>
@@ -7056,7 +7979,7 @@
       <p:sp>
         <p:nvSpPr>
           <p:cNvPr id="62" name="Oval 61">
-            <a:hlinkClick r:id="rId24"/>
+            <a:hlinkClick r:id="rId23"/>
           </p:cNvPr>
           <p:cNvSpPr/>
           <p:nvPr/>
@@ -7128,7 +8051,7 @@
       <p:sp>
         <p:nvSpPr>
           <p:cNvPr id="63" name="Oval 62">
-            <a:hlinkClick r:id="rId25"/>
+            <a:hlinkClick r:id="rId24"/>
           </p:cNvPr>
           <p:cNvSpPr/>
           <p:nvPr/>
@@ -7185,7 +8108,7 @@
       <p:sp>
         <p:nvSpPr>
           <p:cNvPr id="64" name="Oval 63">
-            <a:hlinkClick r:id="rId16"/>
+            <a:hlinkClick r:id="rId15"/>
           </p:cNvPr>
           <p:cNvSpPr/>
           <p:nvPr/>
@@ -7272,7 +8195,7 @@
       <p:sp>
         <p:nvSpPr>
           <p:cNvPr id="65" name="Oval 64">
-            <a:hlinkClick r:id="rId13"/>
+            <a:hlinkClick r:id="rId12"/>
           </p:cNvPr>
           <p:cNvSpPr/>
           <p:nvPr/>
@@ -7344,7 +8267,7 @@
       <p:sp>
         <p:nvSpPr>
           <p:cNvPr id="66" name="Oval 65">
-            <a:hlinkClick r:id="rId17"/>
+            <a:hlinkClick r:id="rId16"/>
           </p:cNvPr>
           <p:cNvSpPr/>
           <p:nvPr/>
@@ -7431,7 +8354,7 @@
       <p:sp>
         <p:nvSpPr>
           <p:cNvPr id="68" name="Oval 67">
-            <a:hlinkClick r:id="rId15"/>
+            <a:hlinkClick r:id="rId14"/>
           </p:cNvPr>
           <p:cNvSpPr/>
           <p:nvPr/>
@@ -7518,7 +8441,7 @@
       <p:sp>
         <p:nvSpPr>
           <p:cNvPr id="69" name="Oval 68">
-            <a:hlinkClick r:id="rId26"/>
+            <a:hlinkClick r:id="rId25"/>
           </p:cNvPr>
           <p:cNvSpPr/>
           <p:nvPr/>
@@ -7675,7 +8598,7 @@
       <p:sp>
         <p:nvSpPr>
           <p:cNvPr id="71" name="Oval 70">
-            <a:hlinkClick r:id="rId27"/>
+            <a:hlinkClick r:id="rId26"/>
           </p:cNvPr>
           <p:cNvSpPr/>
           <p:nvPr/>
@@ -7817,7 +8740,7 @@
       <p:sp>
         <p:nvSpPr>
           <p:cNvPr id="73" name="Oval 72">
-            <a:hlinkClick r:id="rId28"/>
+            <a:hlinkClick r:id="rId27"/>
           </p:cNvPr>
           <p:cNvSpPr/>
           <p:nvPr/>
@@ -7889,7 +8812,7 @@
       <p:sp>
         <p:nvSpPr>
           <p:cNvPr id="74" name="Oval 73">
-            <a:hlinkClick r:id="rId22"/>
+            <a:hlinkClick r:id="rId21"/>
           </p:cNvPr>
           <p:cNvSpPr/>
           <p:nvPr/>
@@ -7976,7 +8899,7 @@
       <p:sp>
         <p:nvSpPr>
           <p:cNvPr id="75" name="Oval 74">
-            <a:hlinkClick r:id="rId24"/>
+            <a:hlinkClick r:id="rId23"/>
           </p:cNvPr>
           <p:cNvSpPr/>
           <p:nvPr/>
@@ -8138,7 +9061,7 @@
         </p:nvSpPr>
         <p:spPr>
           <a:xfrm>
-            <a:off x="1467086" y="5660230"/>
+            <a:off x="1597712" y="5770912"/>
             <a:ext cx="484574" cy="484574"/>
           </a:xfrm>
           <a:prstGeom prst="ellipse">
@@ -8218,7 +9141,7 @@
       <p:sp>
         <p:nvSpPr>
           <p:cNvPr id="78" name="Oval 77">
-            <a:hlinkClick r:id="rId16"/>
+            <a:hlinkClick r:id="rId15"/>
           </p:cNvPr>
           <p:cNvSpPr/>
           <p:nvPr/>
@@ -8305,7 +9228,7 @@
       <p:sp>
         <p:nvSpPr>
           <p:cNvPr id="79" name="Oval 78">
-            <a:hlinkClick r:id="rId23"/>
+            <a:hlinkClick r:id="rId22"/>
           </p:cNvPr>
           <p:cNvSpPr/>
           <p:nvPr/>
@@ -8494,7 +9417,7 @@
                 <a:ea typeface="Open Sans" panose="020B0606030504020204" pitchFamily="34" charset="0"/>
                 <a:cs typeface="Open Sans" panose="020B0606030504020204" pitchFamily="34" charset="0"/>
               </a:rPr>
-              <a:t>Colour</a:t>
+              <a:t>Color</a:t>
             </a:r>
             <a:br>
               <a:rPr lang="en-GB" sz="800" dirty="0">
@@ -8517,7 +9440,7 @@
       <p:sp>
         <p:nvSpPr>
           <p:cNvPr id="82" name="Oval 81">
-            <a:hlinkClick r:id="rId29"/>
+            <a:hlinkClick r:id="rId28"/>
           </p:cNvPr>
           <p:cNvSpPr/>
           <p:nvPr/>
@@ -8589,7 +9512,7 @@
       <p:sp>
         <p:nvSpPr>
           <p:cNvPr id="83" name="Oval 82">
-            <a:hlinkClick r:id="rId30"/>
+            <a:hlinkClick r:id="rId29"/>
           </p:cNvPr>
           <p:cNvSpPr/>
           <p:nvPr/>
@@ -8660,78 +9583,8 @@
       </p:sp>
       <p:sp>
         <p:nvSpPr>
-          <p:cNvPr id="84" name="Oval 83"/>
-          <p:cNvSpPr/>
-          <p:nvPr/>
-        </p:nvSpPr>
-        <p:spPr>
-          <a:xfrm>
-            <a:off x="1740340" y="6115729"/>
-            <a:ext cx="595746" cy="595746"/>
-          </a:xfrm>
-          <a:prstGeom prst="ellipse">
-            <a:avLst/>
-          </a:prstGeom>
-          <a:solidFill>
-            <a:srgbClr val="92CB9C"/>
-          </a:solidFill>
-          <a:ln>
-            <a:noFill/>
-          </a:ln>
-        </p:spPr>
-        <p:style>
-          <a:lnRef idx="2">
-            <a:schemeClr val="accent1">
-              <a:shade val="50000"/>
-            </a:schemeClr>
-          </a:lnRef>
-          <a:fillRef idx="1">
-            <a:schemeClr val="accent1"/>
-          </a:fillRef>
-          <a:effectRef idx="0">
-            <a:schemeClr val="accent1"/>
-          </a:effectRef>
-          <a:fontRef idx="minor">
-            <a:schemeClr val="lt1"/>
-          </a:fontRef>
-        </p:style>
-        <p:txBody>
-          <a:bodyPr wrap="none" lIns="0" tIns="0" rIns="0" bIns="0" rtlCol="0" anchor="ctr">
-            <a:normAutofit/>
-          </a:bodyPr>
-          <a:lstStyle/>
-          <a:p>
-            <a:pPr algn="ctr"/>
-            <a:r>
-              <a:rPr lang="en-GB" sz="800" dirty="0">
-                <a:latin typeface="Open Sans" panose="020B0606030504020204" pitchFamily="34" charset="0"/>
-                <a:ea typeface="Open Sans" panose="020B0606030504020204" pitchFamily="34" charset="0"/>
-                <a:cs typeface="Open Sans" panose="020B0606030504020204" pitchFamily="34" charset="0"/>
-              </a:rPr>
-              <a:t>Automated</a:t>
-            </a:r>
-            <a:br>
-              <a:rPr lang="en-GB" sz="800" dirty="0">
-                <a:latin typeface="Open Sans" panose="020B0606030504020204" pitchFamily="34" charset="0"/>
-                <a:ea typeface="Open Sans" panose="020B0606030504020204" pitchFamily="34" charset="0"/>
-                <a:cs typeface="Open Sans" panose="020B0606030504020204" pitchFamily="34" charset="0"/>
-              </a:rPr>
-            </a:br>
-            <a:r>
-              <a:rPr lang="en-GB" sz="800" dirty="0">
-                <a:latin typeface="Open Sans" panose="020B0606030504020204" pitchFamily="34" charset="0"/>
-                <a:ea typeface="Open Sans" panose="020B0606030504020204" pitchFamily="34" charset="0"/>
-                <a:cs typeface="Open Sans" panose="020B0606030504020204" pitchFamily="34" charset="0"/>
-              </a:rPr>
-              <a:t>Production</a:t>
-            </a:r>
-          </a:p>
-        </p:txBody>
-      </p:sp>
-      <p:sp>
-        <p:nvSpPr>
           <p:cNvPr id="85" name="Oval 84">
-            <a:hlinkClick r:id="rId31"/>
+            <a:hlinkClick r:id="rId30"/>
           </p:cNvPr>
           <p:cNvSpPr/>
           <p:nvPr/>
@@ -8803,7 +9656,7 @@
       <p:sp>
         <p:nvSpPr>
           <p:cNvPr id="86" name="Oval 85">
-            <a:hlinkClick r:id="rId32"/>
+            <a:hlinkClick r:id="rId31"/>
           </p:cNvPr>
           <p:cNvSpPr/>
           <p:nvPr/>
@@ -8875,7 +9728,7 @@
       <p:sp>
         <p:nvSpPr>
           <p:cNvPr id="87" name="Oval 86">
-            <a:hlinkClick r:id="rId25"/>
+            <a:hlinkClick r:id="rId24"/>
           </p:cNvPr>
           <p:cNvSpPr/>
           <p:nvPr/>
@@ -8932,7 +9785,7 @@
       <p:sp>
         <p:nvSpPr>
           <p:cNvPr id="88" name="Oval 87">
-            <a:hlinkClick r:id="rId27"/>
+            <a:hlinkClick r:id="rId26"/>
           </p:cNvPr>
           <p:cNvSpPr/>
           <p:nvPr/>
@@ -8989,7 +9842,7 @@
       <p:sp>
         <p:nvSpPr>
           <p:cNvPr id="89" name="Oval 88">
-            <a:hlinkClick r:id="rId33"/>
+            <a:hlinkClick r:id="rId32"/>
           </p:cNvPr>
           <p:cNvSpPr/>
           <p:nvPr/>
@@ -9131,7 +9984,7 @@
       <p:sp>
         <p:nvSpPr>
           <p:cNvPr id="92" name="Oval 91">
-            <a:hlinkClick r:id="rId16"/>
+            <a:hlinkClick r:id="rId15"/>
           </p:cNvPr>
           <p:cNvSpPr/>
           <p:nvPr/>
@@ -9303,7 +10156,7 @@
       <p:sp>
         <p:nvSpPr>
           <p:cNvPr id="94" name="Oval 93">
-            <a:hlinkClick r:id="rId29"/>
+            <a:hlinkClick r:id="rId28"/>
           </p:cNvPr>
           <p:cNvSpPr/>
           <p:nvPr/>
@@ -9375,7 +10228,7 @@
       <p:sp>
         <p:nvSpPr>
           <p:cNvPr id="95" name="Oval 94">
-            <a:hlinkClick r:id="rId17"/>
+            <a:hlinkClick r:id="rId16"/>
           </p:cNvPr>
           <p:cNvSpPr/>
           <p:nvPr/>
@@ -9547,7 +10400,7 @@
       <p:sp>
         <p:nvSpPr>
           <p:cNvPr id="97" name="Oval 96">
-            <a:hlinkClick r:id="rId34"/>
+            <a:hlinkClick r:id="rId33"/>
           </p:cNvPr>
           <p:cNvSpPr/>
           <p:nvPr/>
@@ -9591,7 +10444,7 @@
           <a:p>
             <a:pPr algn="ctr"/>
             <a:r>
-              <a:rPr lang="en-GB" sz="800" dirty="0" smtClean="0">
+              <a:rPr lang="en-GB" sz="800" dirty="0">
                 <a:latin typeface="Open Sans" panose="020B0606030504020204" pitchFamily="34" charset="0"/>
                 <a:ea typeface="Open Sans" panose="020B0606030504020204" pitchFamily="34" charset="0"/>
                 <a:cs typeface="Open Sans" panose="020B0606030504020204" pitchFamily="34" charset="0"/>
@@ -9602,25 +10455,20 @@
           <a:p>
             <a:pPr algn="ctr"/>
             <a:r>
-              <a:rPr lang="en-GB" sz="800" dirty="0" smtClean="0">
+              <a:rPr lang="en-GB" sz="800" dirty="0">
                 <a:latin typeface="Open Sans" panose="020B0606030504020204" pitchFamily="34" charset="0"/>
                 <a:ea typeface="Open Sans" panose="020B0606030504020204" pitchFamily="34" charset="0"/>
                 <a:cs typeface="Open Sans" panose="020B0606030504020204" pitchFamily="34" charset="0"/>
               </a:rPr>
               <a:t>Share</a:t>
             </a:r>
-            <a:endParaRPr lang="en-GB" sz="800" dirty="0" smtClean="0">
-              <a:latin typeface="Open Sans" panose="020B0606030504020204" pitchFamily="34" charset="0"/>
-              <a:ea typeface="Open Sans" panose="020B0606030504020204" pitchFamily="34" charset="0"/>
-              <a:cs typeface="Open Sans" panose="020B0606030504020204" pitchFamily="34" charset="0"/>
-            </a:endParaRPr>
           </a:p>
         </p:txBody>
       </p:sp>
       <p:sp>
         <p:nvSpPr>
           <p:cNvPr id="98" name="Oval 97">
-            <a:hlinkClick r:id="rId33"/>
+            <a:hlinkClick r:id="rId32"/>
           </p:cNvPr>
           <p:cNvSpPr/>
           <p:nvPr/>
@@ -9692,7 +10540,7 @@
       <p:sp>
         <p:nvSpPr>
           <p:cNvPr id="99" name="Oval 98">
-            <a:hlinkClick r:id="rId35"/>
+            <a:hlinkClick r:id="rId34"/>
           </p:cNvPr>
           <p:cNvSpPr/>
           <p:nvPr/>
@@ -9764,7 +10612,7 @@
       <p:sp>
         <p:nvSpPr>
           <p:cNvPr id="100" name="Oval 99">
-            <a:hlinkClick r:id="rId36"/>
+            <a:hlinkClick r:id="rId35"/>
           </p:cNvPr>
           <p:cNvSpPr/>
           <p:nvPr/>
@@ -9836,7 +10684,7 @@
       <p:sp>
         <p:nvSpPr>
           <p:cNvPr id="101" name="Oval 100">
-            <a:hlinkClick r:id="rId33"/>
+            <a:hlinkClick r:id="rId32"/>
           </p:cNvPr>
           <p:cNvSpPr/>
           <p:nvPr/>
@@ -9908,7 +10756,7 @@
       <p:sp>
         <p:nvSpPr>
           <p:cNvPr id="102" name="Oval 101">
-            <a:hlinkClick r:id="rId33"/>
+            <a:hlinkClick r:id="rId32"/>
           </p:cNvPr>
           <p:cNvSpPr/>
           <p:nvPr/>
@@ -9965,7 +10813,7 @@
       <p:sp>
         <p:nvSpPr>
           <p:cNvPr id="103" name="Oval 102">
-            <a:hlinkClick r:id="rId25"/>
+            <a:hlinkClick r:id="rId24"/>
           </p:cNvPr>
           <p:cNvSpPr/>
           <p:nvPr/>
@@ -10022,7 +10870,7 @@
       <p:sp>
         <p:nvSpPr>
           <p:cNvPr id="104" name="Oval 103">
-            <a:hlinkClick r:id="rId16"/>
+            <a:hlinkClick r:id="rId15"/>
           </p:cNvPr>
           <p:cNvSpPr/>
           <p:nvPr/>
@@ -10086,23 +10934,7 @@
                 <a:ea typeface="Open Sans" panose="020B0606030504020204" pitchFamily="34" charset="0"/>
                 <a:cs typeface="Open Sans" panose="020B0606030504020204" pitchFamily="34" charset="0"/>
               </a:rPr>
-              <a:t>To </a:t>
-            </a:r>
-            <a:r>
-              <a:rPr lang="en-GB" sz="800" dirty="0" smtClean="0">
-                <a:latin typeface="Open Sans" panose="020B0606030504020204" pitchFamily="34" charset="0"/>
-                <a:ea typeface="Open Sans" panose="020B0606030504020204" pitchFamily="34" charset="0"/>
-                <a:cs typeface="Open Sans" panose="020B0606030504020204" pitchFamily="34" charset="0"/>
-              </a:rPr>
-              <a:t>Blog</a:t>
-            </a:r>
-            <a:r>
-              <a:rPr lang="en-GB" sz="800" dirty="0">
-                <a:latin typeface="Open Sans" panose="020B0606030504020204" pitchFamily="34" charset="0"/>
-                <a:ea typeface="Open Sans" panose="020B0606030504020204" pitchFamily="34" charset="0"/>
-                <a:cs typeface="Open Sans" panose="020B0606030504020204" pitchFamily="34" charset="0"/>
-              </a:rPr>
-              <a:t/>
+              <a:t>To Blog</a:t>
             </a:r>
             <a:br>
               <a:rPr lang="en-GB" sz="800" dirty="0">
@@ -10125,7 +10957,7 @@
       <p:sp>
         <p:nvSpPr>
           <p:cNvPr id="105" name="Oval 104">
-            <a:hlinkClick r:id="rId33"/>
+            <a:hlinkClick r:id="rId32"/>
           </p:cNvPr>
           <p:cNvSpPr/>
           <p:nvPr/>
@@ -10341,7 +11173,7 @@
       <p:sp>
         <p:nvSpPr>
           <p:cNvPr id="109" name="Oval 108">
-            <a:hlinkClick r:id="rId37"/>
+            <a:hlinkClick r:id="rId36"/>
           </p:cNvPr>
           <p:cNvSpPr/>
           <p:nvPr/>
@@ -10424,7 +11256,7 @@
       <p:sp>
         <p:nvSpPr>
           <p:cNvPr id="110" name="Oval 109">
-            <a:hlinkClick r:id="rId38"/>
+            <a:hlinkClick r:id="rId37"/>
           </p:cNvPr>
           <p:cNvSpPr/>
           <p:nvPr/>
@@ -10491,7 +11323,7 @@
               </a:rPr>
             </a:br>
             <a:r>
-              <a:rPr lang="en-GB" sz="650" dirty="0" smtClean="0">
+              <a:rPr lang="en-GB" sz="650" dirty="0">
                 <a:solidFill>
                   <a:srgbClr val="00A3B2"/>
                 </a:solidFill>
@@ -10507,7 +11339,7 @@
       <p:sp>
         <p:nvSpPr>
           <p:cNvPr id="111" name="Oval 110">
-            <a:hlinkClick r:id="rId39"/>
+            <a:hlinkClick r:id="rId38"/>
           </p:cNvPr>
           <p:cNvSpPr/>
           <p:nvPr/>
@@ -10590,7 +11422,7 @@
       <p:sp>
         <p:nvSpPr>
           <p:cNvPr id="113" name="Oval 112">
-            <a:hlinkClick r:id="rId40"/>
+            <a:hlinkClick r:id="rId39"/>
           </p:cNvPr>
           <p:cNvSpPr/>
           <p:nvPr/>
@@ -10636,7 +11468,7 @@
           <a:p>
             <a:pPr algn="ctr"/>
             <a:r>
-              <a:rPr lang="en-GB" sz="600" dirty="0" smtClean="0">
+              <a:rPr lang="en-GB" sz="600" dirty="0">
                 <a:solidFill>
                   <a:srgbClr val="00A3B2"/>
                 </a:solidFill>
@@ -10646,14 +11478,6 @@
               </a:rPr>
               <a:t>Research4Life</a:t>
             </a:r>
-            <a:endParaRPr lang="en-GB" sz="600" dirty="0">
-              <a:solidFill>
-                <a:srgbClr val="00A3B2"/>
-              </a:solidFill>
-              <a:latin typeface="Open Sans" panose="020B0606030504020204" pitchFamily="34" charset="0"/>
-              <a:ea typeface="Open Sans" panose="020B0606030504020204" pitchFamily="34" charset="0"/>
-              <a:cs typeface="Open Sans" panose="020B0606030504020204" pitchFamily="34" charset="0"/>
-            </a:endParaRPr>
           </a:p>
         </p:txBody>
       </p:sp>
@@ -10781,7 +11605,7 @@
       <p:sp>
         <p:nvSpPr>
           <p:cNvPr id="112" name="Oval 111">
-            <a:hlinkClick r:id="rId14"/>
+            <a:hlinkClick r:id="rId13"/>
           </p:cNvPr>
           <p:cNvSpPr/>
           <p:nvPr/>
@@ -10864,7 +11688,7 @@
       <p:sp>
         <p:nvSpPr>
           <p:cNvPr id="116" name="Oval 115">
-            <a:hlinkClick r:id="rId34"/>
+            <a:hlinkClick r:id="rId33"/>
           </p:cNvPr>
           <p:cNvSpPr/>
           <p:nvPr/>
@@ -10949,6 +11773,347 @@
           </a:p>
         </p:txBody>
       </p:sp>
+      <p:sp>
+        <p:nvSpPr>
+          <p:cNvPr id="117" name="Oval 116">
+            <a:hlinkClick r:id="rId4"/>
+            <a:extLst>
+              <a:ext uri="{FF2B5EF4-FFF2-40B4-BE49-F238E27FC236}">
+                <a16:creationId xmlns:a16="http://schemas.microsoft.com/office/drawing/2014/main" id="{504DCEE9-9886-4D17-B42E-D1FEB4AF6660}"/>
+              </a:ext>
+            </a:extLst>
+          </p:cNvPr>
+          <p:cNvSpPr/>
+          <p:nvPr/>
+        </p:nvSpPr>
+        <p:spPr>
+          <a:xfrm>
+            <a:off x="6605815" y="1959574"/>
+            <a:ext cx="504056" cy="504056"/>
+          </a:xfrm>
+          <a:prstGeom prst="ellipse">
+            <a:avLst/>
+          </a:prstGeom>
+          <a:solidFill>
+            <a:srgbClr val="E87700"/>
+          </a:solidFill>
+          <a:ln>
+            <a:noFill/>
+          </a:ln>
+        </p:spPr>
+        <p:style>
+          <a:lnRef idx="2">
+            <a:schemeClr val="accent1">
+              <a:shade val="50000"/>
+            </a:schemeClr>
+          </a:lnRef>
+          <a:fillRef idx="1">
+            <a:schemeClr val="accent1"/>
+          </a:fillRef>
+          <a:effectRef idx="0">
+            <a:schemeClr val="accent1"/>
+          </a:effectRef>
+          <a:fontRef idx="minor">
+            <a:schemeClr val="lt1"/>
+          </a:fontRef>
+        </p:style>
+        <p:txBody>
+          <a:bodyPr wrap="none" lIns="0" tIns="0" rIns="0" bIns="0" rtlCol="0" anchor="ctr">
+            <a:normAutofit lnSpcReduction="10000"/>
+          </a:bodyPr>
+          <a:lstStyle/>
+          <a:p>
+            <a:pPr algn="ctr"/>
+            <a:r>
+              <a:rPr lang="en-GB" sz="800" dirty="0">
+                <a:latin typeface="Open Sans" panose="020B0606030504020204" pitchFamily="34" charset="0"/>
+                <a:ea typeface="Open Sans" panose="020B0606030504020204" pitchFamily="34" charset="0"/>
+                <a:cs typeface="Open Sans" panose="020B0606030504020204" pitchFamily="34" charset="0"/>
+              </a:rPr>
+              <a:t>Wiley</a:t>
+            </a:r>
+            <a:br>
+              <a:rPr lang="en-GB" sz="800" dirty="0">
+                <a:latin typeface="Open Sans" panose="020B0606030504020204" pitchFamily="34" charset="0"/>
+                <a:ea typeface="Open Sans" panose="020B0606030504020204" pitchFamily="34" charset="0"/>
+                <a:cs typeface="Open Sans" panose="020B0606030504020204" pitchFamily="34" charset="0"/>
+              </a:rPr>
+            </a:br>
+            <a:r>
+              <a:rPr lang="en-GB" sz="800" dirty="0">
+                <a:latin typeface="Open Sans" panose="020B0606030504020204" pitchFamily="34" charset="0"/>
+                <a:ea typeface="Open Sans" panose="020B0606030504020204" pitchFamily="34" charset="0"/>
+                <a:cs typeface="Open Sans" panose="020B0606030504020204" pitchFamily="34" charset="0"/>
+              </a:rPr>
+              <a:t>Spectra</a:t>
+            </a:r>
+            <a:br>
+              <a:rPr lang="en-GB" sz="800" dirty="0">
+                <a:latin typeface="Open Sans" panose="020B0606030504020204" pitchFamily="34" charset="0"/>
+                <a:ea typeface="Open Sans" panose="020B0606030504020204" pitchFamily="34" charset="0"/>
+                <a:cs typeface="Open Sans" panose="020B0606030504020204" pitchFamily="34" charset="0"/>
+              </a:rPr>
+            </a:br>
+            <a:r>
+              <a:rPr lang="en-GB" sz="800" dirty="0">
+                <a:latin typeface="Open Sans" panose="020B0606030504020204" pitchFamily="34" charset="0"/>
+                <a:ea typeface="Open Sans" panose="020B0606030504020204" pitchFamily="34" charset="0"/>
+                <a:cs typeface="Open Sans" panose="020B0606030504020204" pitchFamily="34" charset="0"/>
+              </a:rPr>
+              <a:t>Lab</a:t>
+            </a:r>
+          </a:p>
+        </p:txBody>
+      </p:sp>
+      <p:sp>
+        <p:nvSpPr>
+          <p:cNvPr id="118" name="Oval 117">
+            <a:hlinkClick r:id="rId40"/>
+            <a:extLst>
+              <a:ext uri="{FF2B5EF4-FFF2-40B4-BE49-F238E27FC236}">
+                <a16:creationId xmlns:a16="http://schemas.microsoft.com/office/drawing/2014/main" id="{68B63577-4AE3-429D-887E-FF8E8F1F43CD}"/>
+              </a:ext>
+            </a:extLst>
+          </p:cNvPr>
+          <p:cNvSpPr/>
+          <p:nvPr/>
+        </p:nvSpPr>
+        <p:spPr>
+          <a:xfrm>
+            <a:off x="7156598" y="1579806"/>
+            <a:ext cx="595746" cy="595746"/>
+          </a:xfrm>
+          <a:prstGeom prst="ellipse">
+            <a:avLst/>
+          </a:prstGeom>
+          <a:solidFill>
+            <a:srgbClr val="E87700"/>
+          </a:solidFill>
+          <a:ln>
+            <a:noFill/>
+          </a:ln>
+        </p:spPr>
+        <p:style>
+          <a:lnRef idx="2">
+            <a:schemeClr val="accent1">
+              <a:shade val="50000"/>
+            </a:schemeClr>
+          </a:lnRef>
+          <a:fillRef idx="1">
+            <a:schemeClr val="accent1"/>
+          </a:fillRef>
+          <a:effectRef idx="0">
+            <a:schemeClr val="accent1"/>
+          </a:effectRef>
+          <a:fontRef idx="minor">
+            <a:schemeClr val="lt1"/>
+          </a:fontRef>
+        </p:style>
+        <p:txBody>
+          <a:bodyPr wrap="none" lIns="0" tIns="0" rIns="0" bIns="0" rtlCol="0" anchor="ctr">
+            <a:normAutofit/>
+          </a:bodyPr>
+          <a:lstStyle/>
+          <a:p>
+            <a:pPr algn="ctr"/>
+            <a:r>
+              <a:rPr lang="en-GB" sz="800" dirty="0">
+                <a:latin typeface="Open Sans" panose="020B0606030504020204" pitchFamily="34" charset="0"/>
+                <a:ea typeface="Open Sans" panose="020B0606030504020204" pitchFamily="34" charset="0"/>
+                <a:cs typeface="Open Sans" panose="020B0606030504020204" pitchFamily="34" charset="0"/>
+              </a:rPr>
+              <a:t>Wiley </a:t>
+            </a:r>
+          </a:p>
+          <a:p>
+            <a:pPr algn="ctr"/>
+            <a:r>
+              <a:rPr lang="en-GB" sz="800" dirty="0">
+                <a:latin typeface="Open Sans" panose="020B0606030504020204" pitchFamily="34" charset="0"/>
+                <a:ea typeface="Open Sans" panose="020B0606030504020204" pitchFamily="34" charset="0"/>
+                <a:cs typeface="Open Sans" panose="020B0606030504020204" pitchFamily="34" charset="0"/>
+              </a:rPr>
+              <a:t>Science </a:t>
+            </a:r>
+          </a:p>
+          <a:p>
+            <a:pPr algn="ctr"/>
+            <a:r>
+              <a:rPr lang="en-GB" sz="800" dirty="0">
+                <a:latin typeface="Open Sans" panose="020B0606030504020204" pitchFamily="34" charset="0"/>
+                <a:ea typeface="Open Sans" panose="020B0606030504020204" pitchFamily="34" charset="0"/>
+                <a:cs typeface="Open Sans" panose="020B0606030504020204" pitchFamily="34" charset="0"/>
+              </a:rPr>
+              <a:t>Solutions</a:t>
+            </a:r>
+          </a:p>
+        </p:txBody>
+      </p:sp>
+      <p:sp>
+        <p:nvSpPr>
+          <p:cNvPr id="119" name="Oval 118">
+            <a:hlinkClick r:id="rId40"/>
+            <a:extLst>
+              <a:ext uri="{FF2B5EF4-FFF2-40B4-BE49-F238E27FC236}">
+                <a16:creationId xmlns:a16="http://schemas.microsoft.com/office/drawing/2014/main" id="{99D35480-AD87-402B-8AB2-56E5076E7377}"/>
+              </a:ext>
+            </a:extLst>
+          </p:cNvPr>
+          <p:cNvSpPr/>
+          <p:nvPr/>
+        </p:nvSpPr>
+        <p:spPr>
+          <a:xfrm>
+            <a:off x="4275402" y="250168"/>
+            <a:ext cx="595746" cy="595746"/>
+          </a:xfrm>
+          <a:prstGeom prst="ellipse">
+            <a:avLst/>
+          </a:prstGeom>
+          <a:solidFill>
+            <a:srgbClr val="00A3B2"/>
+          </a:solidFill>
+          <a:ln>
+            <a:noFill/>
+          </a:ln>
+        </p:spPr>
+        <p:style>
+          <a:lnRef idx="2">
+            <a:schemeClr val="accent1">
+              <a:shade val="50000"/>
+            </a:schemeClr>
+          </a:lnRef>
+          <a:fillRef idx="1">
+            <a:schemeClr val="accent1"/>
+          </a:fillRef>
+          <a:effectRef idx="0">
+            <a:schemeClr val="accent1"/>
+          </a:effectRef>
+          <a:fontRef idx="minor">
+            <a:schemeClr val="lt1"/>
+          </a:fontRef>
+        </p:style>
+        <p:txBody>
+          <a:bodyPr wrap="none" lIns="0" tIns="0" rIns="0" bIns="0" rtlCol="0" anchor="ctr">
+            <a:normAutofit/>
+          </a:bodyPr>
+          <a:lstStyle/>
+          <a:p>
+            <a:pPr algn="ctr"/>
+            <a:r>
+              <a:rPr lang="en-GB" sz="800" dirty="0">
+                <a:latin typeface="Open Sans" panose="020B0606030504020204" pitchFamily="34" charset="0"/>
+                <a:ea typeface="Open Sans" panose="020B0606030504020204" pitchFamily="34" charset="0"/>
+                <a:cs typeface="Open Sans" panose="020B0606030504020204" pitchFamily="34" charset="0"/>
+              </a:rPr>
+              <a:t>Wiley </a:t>
+            </a:r>
+          </a:p>
+          <a:p>
+            <a:pPr algn="ctr"/>
+            <a:r>
+              <a:rPr lang="en-GB" sz="800" dirty="0">
+                <a:latin typeface="Open Sans" panose="020B0606030504020204" pitchFamily="34" charset="0"/>
+                <a:ea typeface="Open Sans" panose="020B0606030504020204" pitchFamily="34" charset="0"/>
+                <a:cs typeface="Open Sans" panose="020B0606030504020204" pitchFamily="34" charset="0"/>
+              </a:rPr>
+              <a:t>Science </a:t>
+            </a:r>
+          </a:p>
+          <a:p>
+            <a:pPr algn="ctr"/>
+            <a:r>
+              <a:rPr lang="en-GB" sz="800" dirty="0">
+                <a:latin typeface="Open Sans" panose="020B0606030504020204" pitchFamily="34" charset="0"/>
+                <a:ea typeface="Open Sans" panose="020B0606030504020204" pitchFamily="34" charset="0"/>
+                <a:cs typeface="Open Sans" panose="020B0606030504020204" pitchFamily="34" charset="0"/>
+              </a:rPr>
+              <a:t>Solutions</a:t>
+            </a:r>
+          </a:p>
+        </p:txBody>
+      </p:sp>
+      <p:sp>
+        <p:nvSpPr>
+          <p:cNvPr id="120" name="Oval 119">
+            <a:hlinkClick r:id="rId41"/>
+            <a:extLst>
+              <a:ext uri="{FF2B5EF4-FFF2-40B4-BE49-F238E27FC236}">
+                <a16:creationId xmlns:a16="http://schemas.microsoft.com/office/drawing/2014/main" id="{B69B5DE8-19EB-49B1-8F02-FBDF1EF273DA}"/>
+              </a:ext>
+            </a:extLst>
+          </p:cNvPr>
+          <p:cNvSpPr/>
+          <p:nvPr/>
+        </p:nvSpPr>
+        <p:spPr>
+          <a:xfrm>
+            <a:off x="876799" y="5191839"/>
+            <a:ext cx="777240" cy="777240"/>
+          </a:xfrm>
+          <a:prstGeom prst="ellipse">
+            <a:avLst/>
+          </a:prstGeom>
+          <a:solidFill>
+            <a:srgbClr val="92CB9C"/>
+          </a:solidFill>
+          <a:ln>
+            <a:noFill/>
+          </a:ln>
+        </p:spPr>
+        <p:style>
+          <a:lnRef idx="2">
+            <a:schemeClr val="accent1">
+              <a:shade val="50000"/>
+            </a:schemeClr>
+          </a:lnRef>
+          <a:fillRef idx="1">
+            <a:schemeClr val="accent1"/>
+          </a:fillRef>
+          <a:effectRef idx="0">
+            <a:schemeClr val="accent1"/>
+          </a:effectRef>
+          <a:fontRef idx="minor">
+            <a:schemeClr val="lt1"/>
+          </a:fontRef>
+        </p:style>
+        <p:txBody>
+          <a:bodyPr wrap="none" lIns="0" tIns="0" rIns="0" bIns="0" rtlCol="0" anchor="ctr">
+            <a:normAutofit/>
+          </a:bodyPr>
+          <a:lstStyle/>
+          <a:p>
+            <a:pPr algn="ctr"/>
+            <a:r>
+              <a:rPr lang="en-GB" sz="800" dirty="0">
+                <a:latin typeface="Open Sans" panose="020B0606030504020204" pitchFamily="34" charset="0"/>
+                <a:ea typeface="Open Sans" panose="020B0606030504020204" pitchFamily="34" charset="0"/>
+                <a:cs typeface="Open Sans" panose="020B0606030504020204" pitchFamily="34" charset="0"/>
+              </a:rPr>
+              <a:t>Supplementary</a:t>
+            </a:r>
+          </a:p>
+          <a:p>
+            <a:pPr algn="ctr"/>
+            <a:r>
+              <a:rPr lang="en-GB" sz="800" dirty="0">
+                <a:latin typeface="Open Sans" panose="020B0606030504020204" pitchFamily="34" charset="0"/>
+                <a:ea typeface="Open Sans" panose="020B0606030504020204" pitchFamily="34" charset="0"/>
+                <a:cs typeface="Open Sans" panose="020B0606030504020204" pitchFamily="34" charset="0"/>
+              </a:rPr>
+              <a:t>Info</a:t>
+            </a:r>
+            <a:endParaRPr lang="en-GB" sz="800" dirty="0">
+              <a:solidFill>
+                <a:srgbClr val="FF0000"/>
+              </a:solidFill>
+              <a:latin typeface="Open Sans" panose="020B0606030504020204" pitchFamily="34" charset="0"/>
+              <a:ea typeface="Open Sans" panose="020B0606030504020204" pitchFamily="34" charset="0"/>
+              <a:cs typeface="Open Sans" panose="020B0606030504020204" pitchFamily="34" charset="0"/>
+            </a:endParaRPr>
+          </a:p>
+        </p:txBody>
+      </p:sp>
     </p:spTree>
     <p:extLst>
       <p:ext uri="{BB962C8B-B14F-4D97-AF65-F5344CB8AC3E}">
@@ -10959,17 +12124,10 @@
   <p:clrMapOvr>
     <a:masterClrMapping/>
   </p:clrMapOvr>
-  <p:timing>
-    <p:tnLst>
-      <p:par>
-        <p:cTn id="1" dur="indefinite" restart="never" nodeType="tmRoot"/>
-      </p:par>
-    </p:tnLst>
-  </p:timing>
 </p:sld>
 </file>
 
-<file path=ppt/slides/slide2.xml><?xml version="1.0" encoding="utf-8"?>
+<file path=ppt/slides/slide3.xml><?xml version="1.0" encoding="utf-8"?>
 <p:sld xmlns:a="http://schemas.openxmlformats.org/drawingml/2006/main" xmlns:r="http://schemas.openxmlformats.org/officeDocument/2006/relationships" xmlns:p="http://schemas.openxmlformats.org/presentationml/2006/main">
   <p:cSld>
     <p:spTree>
@@ -11295,7 +12453,7 @@
               <a:tabLst/>
               <a:defRPr/>
             </a:pPr>
-            <a:endParaRPr kumimoji="0" lang="en-US" sz="1800" b="0" i="0" u="none" strike="noStrike" kern="0" cap="none" spc="0" normalizeH="0" baseline="0" noProof="0" smtClean="0">
+            <a:endParaRPr kumimoji="0" lang="en-US" sz="1800" b="0" i="0" u="none" strike="noStrike" kern="0" cap="none" spc="0" normalizeH="0" baseline="0" noProof="0">
               <a:ln>
                 <a:noFill/>
               </a:ln>
@@ -11716,26 +12874,28 @@
               </a:rPr>
               <a:t>Wiley</a:t>
             </a:r>
-            <a:br>
+          </a:p>
+          <a:p>
+            <a:pPr algn="ctr"/>
+            <a:r>
               <a:rPr lang="en-GB" sz="1000" dirty="0">
                 <a:latin typeface="Open Sans" panose="020B0606030504020204" pitchFamily="34" charset="0"/>
                 <a:ea typeface="Open Sans" panose="020B0606030504020204" pitchFamily="34" charset="0"/>
                 <a:cs typeface="Open Sans" panose="020B0606030504020204" pitchFamily="34" charset="0"/>
               </a:rPr>
-            </a:br>
-            <a:r>
-              <a:rPr lang="en-GB" sz="1000" dirty="0" smtClean="0">
-                <a:latin typeface="Open Sans" panose="020B0606030504020204" pitchFamily="34" charset="0"/>
-                <a:ea typeface="Open Sans" panose="020B0606030504020204" pitchFamily="34" charset="0"/>
-                <a:cs typeface="Open Sans" panose="020B0606030504020204" pitchFamily="34" charset="0"/>
-              </a:rPr>
-              <a:t>ChemPlanner</a:t>
-            </a:r>
-            <a:endParaRPr lang="en-GB" sz="1000" dirty="0">
-              <a:latin typeface="Open Sans" panose="020B0606030504020204" pitchFamily="34" charset="0"/>
-              <a:ea typeface="Open Sans" panose="020B0606030504020204" pitchFamily="34" charset="0"/>
-              <a:cs typeface="Open Sans" panose="020B0606030504020204" pitchFamily="34" charset="0"/>
-            </a:endParaRPr>
+              <a:t>Science</a:t>
+            </a:r>
+          </a:p>
+          <a:p>
+            <a:pPr algn="ctr"/>
+            <a:r>
+              <a:rPr lang="en-GB" sz="1000" dirty="0">
+                <a:latin typeface="Open Sans" panose="020B0606030504020204" pitchFamily="34" charset="0"/>
+                <a:ea typeface="Open Sans" panose="020B0606030504020204" pitchFamily="34" charset="0"/>
+                <a:cs typeface="Open Sans" panose="020B0606030504020204" pitchFamily="34" charset="0"/>
+              </a:rPr>
+              <a:t>Solutions</a:t>
+            </a:r>
           </a:p>
         </p:txBody>
       </p:sp>
@@ -12699,7 +13859,7 @@
           <a:p>
             <a:pPr algn="ctr"/>
             <a:r>
-              <a:rPr lang="en-GB" sz="1000" dirty="0" smtClean="0">
+              <a:rPr lang="en-GB" sz="1000" dirty="0">
                 <a:solidFill>
                   <a:srgbClr val="00A3B2"/>
                 </a:solidFill>
@@ -12713,7 +13873,7 @@
           <a:p>
             <a:pPr algn="ctr"/>
             <a:r>
-              <a:rPr lang="en-GB" sz="1000" dirty="0" smtClean="0">
+              <a:rPr lang="en-GB" sz="1000" dirty="0">
                 <a:solidFill>
                   <a:srgbClr val="00A3B2"/>
                 </a:solidFill>
@@ -12727,7 +13887,7 @@
           <a:p>
             <a:pPr algn="ctr"/>
             <a:r>
-              <a:rPr lang="en-GB" sz="1000" dirty="0" smtClean="0">
+              <a:rPr lang="en-GB" sz="1000" dirty="0">
                 <a:solidFill>
                   <a:srgbClr val="00A3B2"/>
                 </a:solidFill>
@@ -12737,14 +13897,6 @@
               </a:rPr>
               <a:t>Sharing</a:t>
             </a:r>
-            <a:endParaRPr lang="en-GB" sz="1000" dirty="0">
-              <a:solidFill>
-                <a:srgbClr val="00A3B2"/>
-              </a:solidFill>
-              <a:latin typeface="Open Sans" panose="020B0606030504020204" pitchFamily="34" charset="0"/>
-              <a:ea typeface="Open Sans" panose="020B0606030504020204" pitchFamily="34" charset="0"/>
-              <a:cs typeface="Open Sans" panose="020B0606030504020204" pitchFamily="34" charset="0"/>
-            </a:endParaRPr>
           </a:p>
         </p:txBody>
       </p:sp>
@@ -13055,7 +14207,7 @@
               <a:tabLst/>
               <a:defRPr/>
             </a:pPr>
-            <a:endParaRPr kumimoji="0" lang="en-US" sz="1800" b="0" i="0" u="none" strike="noStrike" kern="0" cap="none" spc="0" normalizeH="0" baseline="0" noProof="0" smtClean="0">
+            <a:endParaRPr kumimoji="0" lang="en-US" sz="1800" b="0" i="0" u="none" strike="noStrike" kern="0" cap="none" spc="0" normalizeH="0" baseline="0" noProof="0">
               <a:ln>
                 <a:noFill/>
               </a:ln>
@@ -13115,7 +14267,7 @@
               <a:tabLst/>
               <a:defRPr/>
             </a:pPr>
-            <a:endParaRPr kumimoji="0" lang="en-US" sz="1800" b="0" i="0" u="none" strike="noStrike" kern="0" cap="none" spc="0" normalizeH="0" baseline="0" noProof="0" smtClean="0">
+            <a:endParaRPr kumimoji="0" lang="en-US" sz="1800" b="0" i="0" u="none" strike="noStrike" kern="0" cap="none" spc="0" normalizeH="0" baseline="0" noProof="0">
               <a:ln>
                 <a:noFill/>
               </a:ln>
@@ -13135,24 +14287,17 @@
     </p:spTree>
     <p:extLst>
       <p:ext uri="{BB962C8B-B14F-4D97-AF65-F5344CB8AC3E}">
-        <p14:creationId xmlns:p14="http://schemas.microsoft.com/office/powerpoint/2010/main" val="1132080460"/>
+        <p14:creationId xmlns:p14="http://schemas.microsoft.com/office/powerpoint/2010/main" val="2447317640"/>
       </p:ext>
     </p:extLst>
   </p:cSld>
   <p:clrMapOvr>
     <a:masterClrMapping/>
   </p:clrMapOvr>
-  <p:timing>
-    <p:tnLst>
-      <p:par>
-        <p:cTn id="1" dur="indefinite" restart="never" nodeType="tmRoot"/>
-      </p:par>
-    </p:tnLst>
-  </p:timing>
 </p:sld>
 </file>
 
-<file path=ppt/slides/slide3.xml><?xml version="1.0" encoding="utf-8"?>
+<file path=ppt/slides/slide4.xml><?xml version="1.0" encoding="utf-8"?>
 <p:sld xmlns:a="http://schemas.openxmlformats.org/drawingml/2006/main" xmlns:r="http://schemas.openxmlformats.org/officeDocument/2006/relationships" xmlns:p="http://schemas.openxmlformats.org/presentationml/2006/main">
   <p:cSld>
     <p:spTree>
@@ -13171,7 +14316,7 @@
       </p:grpSpPr>
       <p:sp>
         <p:nvSpPr>
-          <p:cNvPr id="28" name="Freeform 27"/>
+          <p:cNvPr id="57" name="Freeform 56"/>
           <p:cNvSpPr>
             <a:spLocks noChangeArrowheads="1"/>
           </p:cNvSpPr>
@@ -13478,7 +14623,1428 @@
               <a:tabLst/>
               <a:defRPr/>
             </a:pPr>
-            <a:endParaRPr kumimoji="0" lang="en-US" sz="1800" b="0" i="0" u="none" strike="noStrike" kern="0" cap="none" spc="0" normalizeH="0" baseline="0" noProof="0" smtClean="0">
+            <a:endParaRPr kumimoji="0" lang="en-US" sz="1800" b="0" i="0" u="none" strike="noStrike" kern="0" cap="none" spc="0" normalizeH="0" baseline="0" noProof="0">
+              <a:ln>
+                <a:noFill/>
+              </a:ln>
+              <a:solidFill>
+                <a:srgbClr val="000000"/>
+              </a:solidFill>
+              <a:effectLst/>
+              <a:uLnTx/>
+              <a:uFillTx/>
+              <a:latin typeface="Franklin Gothic Book"/>
+            </a:endParaRPr>
+          </a:p>
+        </p:txBody>
+      </p:sp>
+      <p:sp>
+        <p:nvSpPr>
+          <p:cNvPr id="15" name="Oval 14">
+            <a:hlinkClick r:id="rId3"/>
+          </p:cNvPr>
+          <p:cNvSpPr/>
+          <p:nvPr/>
+        </p:nvSpPr>
+        <p:spPr>
+          <a:xfrm>
+            <a:off x="4511193" y="3501008"/>
+            <a:ext cx="973308" cy="973308"/>
+          </a:xfrm>
+          <a:prstGeom prst="ellipse">
+            <a:avLst/>
+          </a:prstGeom>
+          <a:solidFill>
+            <a:srgbClr val="E87700"/>
+          </a:solidFill>
+          <a:ln>
+            <a:noFill/>
+          </a:ln>
+        </p:spPr>
+        <p:style>
+          <a:lnRef idx="2">
+            <a:schemeClr val="accent1">
+              <a:shade val="50000"/>
+            </a:schemeClr>
+          </a:lnRef>
+          <a:fillRef idx="1">
+            <a:schemeClr val="accent1"/>
+          </a:fillRef>
+          <a:effectRef idx="0">
+            <a:schemeClr val="accent1"/>
+          </a:effectRef>
+          <a:fontRef idx="minor">
+            <a:schemeClr val="lt1"/>
+          </a:fontRef>
+        </p:style>
+        <p:txBody>
+          <a:bodyPr wrap="none" lIns="0" tIns="0" rIns="0" bIns="0" rtlCol="0" anchor="ctr">
+            <a:normAutofit/>
+          </a:bodyPr>
+          <a:lstStyle/>
+          <a:p>
+            <a:pPr algn="ctr"/>
+            <a:r>
+              <a:rPr lang="en-GB" sz="1400" dirty="0">
+                <a:latin typeface="Open Sans" panose="020B0606030504020204" pitchFamily="34" charset="0"/>
+                <a:ea typeface="Open Sans" panose="020B0606030504020204" pitchFamily="34" charset="0"/>
+                <a:cs typeface="Open Sans" panose="020B0606030504020204" pitchFamily="34" charset="0"/>
+              </a:rPr>
+              <a:t>Wiley</a:t>
+            </a:r>
+            <a:br>
+              <a:rPr lang="en-GB" sz="1400" dirty="0">
+                <a:latin typeface="Open Sans" panose="020B0606030504020204" pitchFamily="34" charset="0"/>
+                <a:ea typeface="Open Sans" panose="020B0606030504020204" pitchFamily="34" charset="0"/>
+                <a:cs typeface="Open Sans" panose="020B0606030504020204" pitchFamily="34" charset="0"/>
+              </a:rPr>
+            </a:br>
+            <a:r>
+              <a:rPr lang="en-GB" sz="1400" dirty="0">
+                <a:latin typeface="Open Sans" panose="020B0606030504020204" pitchFamily="34" charset="0"/>
+                <a:ea typeface="Open Sans" panose="020B0606030504020204" pitchFamily="34" charset="0"/>
+                <a:cs typeface="Open Sans" panose="020B0606030504020204" pitchFamily="34" charset="0"/>
+              </a:rPr>
+              <a:t>Spectra</a:t>
+            </a:r>
+            <a:br>
+              <a:rPr lang="en-GB" sz="1400" dirty="0">
+                <a:latin typeface="Open Sans" panose="020B0606030504020204" pitchFamily="34" charset="0"/>
+                <a:ea typeface="Open Sans" panose="020B0606030504020204" pitchFamily="34" charset="0"/>
+                <a:cs typeface="Open Sans" panose="020B0606030504020204" pitchFamily="34" charset="0"/>
+              </a:rPr>
+            </a:br>
+            <a:r>
+              <a:rPr lang="en-GB" sz="1400" dirty="0">
+                <a:latin typeface="Open Sans" panose="020B0606030504020204" pitchFamily="34" charset="0"/>
+                <a:ea typeface="Open Sans" panose="020B0606030504020204" pitchFamily="34" charset="0"/>
+                <a:cs typeface="Open Sans" panose="020B0606030504020204" pitchFamily="34" charset="0"/>
+              </a:rPr>
+              <a:t>Lab</a:t>
+            </a:r>
+          </a:p>
+        </p:txBody>
+      </p:sp>
+      <p:sp>
+        <p:nvSpPr>
+          <p:cNvPr id="21" name="Oval 20">
+            <a:hlinkClick r:id="rId4"/>
+          </p:cNvPr>
+          <p:cNvSpPr/>
+          <p:nvPr/>
+        </p:nvSpPr>
+        <p:spPr>
+          <a:xfrm>
+            <a:off x="3574281" y="2865266"/>
+            <a:ext cx="850386" cy="850386"/>
+          </a:xfrm>
+          <a:prstGeom prst="ellipse">
+            <a:avLst/>
+          </a:prstGeom>
+          <a:solidFill>
+            <a:srgbClr val="E87700"/>
+          </a:solidFill>
+          <a:ln>
+            <a:noFill/>
+          </a:ln>
+        </p:spPr>
+        <p:style>
+          <a:lnRef idx="2">
+            <a:schemeClr val="accent1">
+              <a:shade val="50000"/>
+            </a:schemeClr>
+          </a:lnRef>
+          <a:fillRef idx="1">
+            <a:schemeClr val="accent1"/>
+          </a:fillRef>
+          <a:effectRef idx="0">
+            <a:schemeClr val="accent1"/>
+          </a:effectRef>
+          <a:fontRef idx="minor">
+            <a:schemeClr val="lt1"/>
+          </a:fontRef>
+        </p:style>
+        <p:txBody>
+          <a:bodyPr wrap="none" lIns="0" tIns="0" rIns="0" bIns="0" rtlCol="0" anchor="ctr">
+            <a:normAutofit/>
+          </a:bodyPr>
+          <a:lstStyle/>
+          <a:p>
+            <a:pPr algn="ctr"/>
+            <a:r>
+              <a:rPr lang="en-GB" sz="1000" dirty="0">
+                <a:latin typeface="Open Sans" panose="020B0606030504020204" pitchFamily="34" charset="0"/>
+                <a:ea typeface="Open Sans" panose="020B0606030504020204" pitchFamily="34" charset="0"/>
+                <a:cs typeface="Open Sans" panose="020B0606030504020204" pitchFamily="34" charset="0"/>
+              </a:rPr>
+              <a:t>Wiley</a:t>
+            </a:r>
+          </a:p>
+          <a:p>
+            <a:pPr algn="ctr"/>
+            <a:r>
+              <a:rPr lang="en-GB" sz="1000" dirty="0">
+                <a:latin typeface="Open Sans" panose="020B0606030504020204" pitchFamily="34" charset="0"/>
+                <a:ea typeface="Open Sans" panose="020B0606030504020204" pitchFamily="34" charset="0"/>
+                <a:cs typeface="Open Sans" panose="020B0606030504020204" pitchFamily="34" charset="0"/>
+              </a:rPr>
+              <a:t>Science</a:t>
+            </a:r>
+          </a:p>
+          <a:p>
+            <a:pPr algn="ctr"/>
+            <a:r>
+              <a:rPr lang="en-GB" sz="1000" dirty="0">
+                <a:latin typeface="Open Sans" panose="020B0606030504020204" pitchFamily="34" charset="0"/>
+                <a:ea typeface="Open Sans" panose="020B0606030504020204" pitchFamily="34" charset="0"/>
+                <a:cs typeface="Open Sans" panose="020B0606030504020204" pitchFamily="34" charset="0"/>
+              </a:rPr>
+              <a:t>Solutions</a:t>
+            </a:r>
+          </a:p>
+        </p:txBody>
+      </p:sp>
+      <p:sp>
+        <p:nvSpPr>
+          <p:cNvPr id="30" name="Rectangle 29"/>
+          <p:cNvSpPr/>
+          <p:nvPr/>
+        </p:nvSpPr>
+        <p:spPr>
+          <a:xfrm>
+            <a:off x="4490398" y="2750696"/>
+            <a:ext cx="1380536" cy="539763"/>
+          </a:xfrm>
+          <a:prstGeom prst="rect">
+            <a:avLst/>
+          </a:prstGeom>
+        </p:spPr>
+        <p:txBody>
+          <a:bodyPr wrap="square">
+            <a:spAutoFit/>
+          </a:bodyPr>
+          <a:lstStyle/>
+          <a:p>
+            <a:pPr algn="ctr">
+              <a:lnSpc>
+                <a:spcPct val="80000"/>
+              </a:lnSpc>
+            </a:pPr>
+            <a:r>
+              <a:rPr lang="en-GB" dirty="0">
+                <a:solidFill>
+                  <a:srgbClr val="2A2A28"/>
+                </a:solidFill>
+                <a:latin typeface="Open Sans Semibold" panose="020B0706030804020204" pitchFamily="34" charset="0"/>
+                <a:ea typeface="Open Sans Semibold" panose="020B0706030804020204" pitchFamily="34" charset="0"/>
+                <a:cs typeface="Open Sans Semibold" panose="020B0706030804020204" pitchFamily="34" charset="0"/>
+              </a:rPr>
+              <a:t>Tool or</a:t>
+            </a:r>
+            <a:br>
+              <a:rPr lang="en-GB" dirty="0">
+                <a:solidFill>
+                  <a:srgbClr val="2A2A28"/>
+                </a:solidFill>
+                <a:latin typeface="Open Sans Semibold" panose="020B0706030804020204" pitchFamily="34" charset="0"/>
+                <a:ea typeface="Open Sans Semibold" panose="020B0706030804020204" pitchFamily="34" charset="0"/>
+                <a:cs typeface="Open Sans Semibold" panose="020B0706030804020204" pitchFamily="34" charset="0"/>
+              </a:rPr>
+            </a:br>
+            <a:r>
+              <a:rPr lang="en-GB" dirty="0">
+                <a:solidFill>
+                  <a:srgbClr val="2A2A28"/>
+                </a:solidFill>
+                <a:latin typeface="Open Sans Semibold" panose="020B0706030804020204" pitchFamily="34" charset="0"/>
+                <a:ea typeface="Open Sans Semibold" panose="020B0706030804020204" pitchFamily="34" charset="0"/>
+                <a:cs typeface="Open Sans Semibold" panose="020B0706030804020204" pitchFamily="34" charset="0"/>
+              </a:rPr>
+              <a:t>Product</a:t>
+            </a:r>
+          </a:p>
+        </p:txBody>
+      </p:sp>
+      <p:grpSp>
+        <p:nvGrpSpPr>
+          <p:cNvPr id="35" name="Group 34"/>
+          <p:cNvGrpSpPr/>
+          <p:nvPr/>
+        </p:nvGrpSpPr>
+        <p:grpSpPr>
+          <a:xfrm>
+            <a:off x="864284" y="370352"/>
+            <a:ext cx="1618488" cy="1618488"/>
+            <a:chOff x="4355168" y="1122321"/>
+            <a:chExt cx="1153743" cy="1153743"/>
+          </a:xfrm>
+        </p:grpSpPr>
+        <p:sp>
+          <p:nvSpPr>
+            <p:cNvPr id="36" name="Oval 35"/>
+            <p:cNvSpPr/>
+            <p:nvPr/>
+          </p:nvSpPr>
+          <p:spPr>
+            <a:xfrm>
+              <a:off x="4571999" y="1339152"/>
+              <a:ext cx="769162" cy="769162"/>
+            </a:xfrm>
+            <a:prstGeom prst="ellipse">
+              <a:avLst/>
+            </a:prstGeom>
+            <a:blipFill dpi="0" rotWithShape="0">
+              <a:blip r:embed="rId5"/>
+              <a:srcRect/>
+              <a:stretch>
+                <a:fillRect/>
+              </a:stretch>
+            </a:blipFill>
+            <a:ln w="85725">
+              <a:solidFill>
+                <a:srgbClr val="E87700"/>
+              </a:solidFill>
+            </a:ln>
+            <a:effectLst>
+              <a:glow rad="50800">
+                <a:schemeClr val="tx1">
+                  <a:alpha val="10000"/>
+                </a:schemeClr>
+              </a:glow>
+              <a:innerShdw blurRad="127000">
+                <a:schemeClr val="tx1"/>
+              </a:innerShdw>
+              <a:softEdge rad="0"/>
+            </a:effectLst>
+          </p:spPr>
+          <p:style>
+            <a:lnRef idx="2">
+              <a:schemeClr val="accent1">
+                <a:shade val="50000"/>
+              </a:schemeClr>
+            </a:lnRef>
+            <a:fillRef idx="1">
+              <a:schemeClr val="accent1"/>
+            </a:fillRef>
+            <a:effectRef idx="0">
+              <a:schemeClr val="accent1"/>
+            </a:effectRef>
+            <a:fontRef idx="minor">
+              <a:schemeClr val="lt1"/>
+            </a:fontRef>
+          </p:style>
+          <p:txBody>
+            <a:bodyPr wrap="none" lIns="0" tIns="0" rIns="0" bIns="0" rtlCol="0" anchor="ctr">
+              <a:noAutofit/>
+            </a:bodyPr>
+            <a:lstStyle/>
+            <a:p>
+              <a:pPr algn="ctr"/>
+              <a:r>
+                <a:rPr lang="en-GB" sz="6800" b="1" dirty="0">
+                  <a:solidFill>
+                    <a:schemeClr val="lt1">
+                      <a:alpha val="75000"/>
+                    </a:schemeClr>
+                  </a:solidFill>
+                  <a:latin typeface="Open Sans Semibold" panose="020B0706030804020204" pitchFamily="34" charset="0"/>
+                  <a:ea typeface="Open Sans Semibold" panose="020B0706030804020204" pitchFamily="34" charset="0"/>
+                  <a:cs typeface="Open Sans Semibold" panose="020B0706030804020204" pitchFamily="34" charset="0"/>
+                </a:rPr>
+                <a:t>2</a:t>
+              </a:r>
+            </a:p>
+          </p:txBody>
+        </p:sp>
+        <p:sp>
+          <p:nvSpPr>
+            <p:cNvPr id="37" name="Rectangle 36"/>
+            <p:cNvSpPr/>
+            <p:nvPr/>
+          </p:nvSpPr>
+          <p:spPr>
+            <a:xfrm rot="20873163">
+              <a:off x="4355168" y="1122321"/>
+              <a:ext cx="1153743" cy="1153743"/>
+            </a:xfrm>
+            <a:prstGeom prst="rect">
+              <a:avLst/>
+            </a:prstGeom>
+            <a:noFill/>
+          </p:spPr>
+          <p:txBody>
+            <a:bodyPr wrap="none" lIns="91440" tIns="45720" rIns="91440" bIns="45720">
+              <a:prstTxWarp prst="textArchDown">
+                <a:avLst>
+                  <a:gd name="adj" fmla="val 3219738"/>
+                </a:avLst>
+              </a:prstTxWarp>
+              <a:spAutoFit/>
+            </a:bodyPr>
+            <a:lstStyle/>
+            <a:p>
+              <a:pPr algn="ctr"/>
+              <a:r>
+                <a:rPr lang="en-US" sz="5400" b="1" cap="none" spc="0" dirty="0">
+                  <a:ln w="12700">
+                    <a:noFill/>
+                    <a:prstDash val="solid"/>
+                  </a:ln>
+                  <a:solidFill>
+                    <a:srgbClr val="E87700"/>
+                  </a:solidFill>
+                  <a:latin typeface="Open Sans Semibold" panose="020B0706030804020204" pitchFamily="34" charset="0"/>
+                  <a:ea typeface="Open Sans Semibold" panose="020B0706030804020204" pitchFamily="34" charset="0"/>
+                  <a:cs typeface="Open Sans Semibold" panose="020B0706030804020204" pitchFamily="34" charset="0"/>
+                </a:rPr>
+                <a:t>Analysis</a:t>
+              </a:r>
+            </a:p>
+          </p:txBody>
+        </p:sp>
+      </p:grpSp>
+      <p:sp>
+        <p:nvSpPr>
+          <p:cNvPr id="55" name="Freeform 54"/>
+          <p:cNvSpPr>
+            <a:spLocks noChangeArrowheads="1"/>
+          </p:cNvSpPr>
+          <p:nvPr/>
+        </p:nvSpPr>
+        <p:spPr bwMode="auto">
+          <a:xfrm rot="10293731" flipH="1" flipV="1">
+            <a:off x="5604304" y="-4183575"/>
+            <a:ext cx="2715244" cy="5437340"/>
+          </a:xfrm>
+          <a:custGeom>
+            <a:avLst/>
+            <a:gdLst>
+              <a:gd name="T0" fmla="*/ 10484 w 10485"/>
+              <a:gd name="T1" fmla="*/ 10372 h 21000"/>
+              <a:gd name="T2" fmla="*/ 10484 w 10485"/>
+              <a:gd name="T3" fmla="*/ 10372 h 21000"/>
+              <a:gd name="T4" fmla="*/ 7396 w 10485"/>
+              <a:gd name="T5" fmla="*/ 3033 h 21000"/>
+              <a:gd name="T6" fmla="*/ 85 w 10485"/>
+              <a:gd name="T7" fmla="*/ 0 h 21000"/>
+              <a:gd name="T8" fmla="*/ 28 w 10485"/>
+              <a:gd name="T9" fmla="*/ 0 h 21000"/>
+              <a:gd name="T10" fmla="*/ 0 w 10485"/>
+              <a:gd name="T11" fmla="*/ 56 h 21000"/>
+              <a:gd name="T12" fmla="*/ 28 w 10485"/>
+              <a:gd name="T13" fmla="*/ 85 h 21000"/>
+              <a:gd name="T14" fmla="*/ 28 w 10485"/>
+              <a:gd name="T15" fmla="*/ 85 h 21000"/>
+              <a:gd name="T16" fmla="*/ 85 w 10485"/>
+              <a:gd name="T17" fmla="*/ 85 h 21000"/>
+              <a:gd name="T18" fmla="*/ 7339 w 10485"/>
+              <a:gd name="T19" fmla="*/ 3089 h 21000"/>
+              <a:gd name="T20" fmla="*/ 10400 w 10485"/>
+              <a:gd name="T21" fmla="*/ 10372 h 21000"/>
+              <a:gd name="T22" fmla="*/ 7396 w 10485"/>
+              <a:gd name="T23" fmla="*/ 17712 h 21000"/>
+              <a:gd name="T24" fmla="*/ 141 w 10485"/>
+              <a:gd name="T25" fmla="*/ 20744 h 21000"/>
+              <a:gd name="T26" fmla="*/ 255 w 10485"/>
+              <a:gd name="T27" fmla="*/ 20659 h 21000"/>
+              <a:gd name="T28" fmla="*/ 255 w 10485"/>
+              <a:gd name="T29" fmla="*/ 20603 h 21000"/>
+              <a:gd name="T30" fmla="*/ 199 w 10485"/>
+              <a:gd name="T31" fmla="*/ 20603 h 21000"/>
+              <a:gd name="T32" fmla="*/ 28 w 10485"/>
+              <a:gd name="T33" fmla="*/ 20772 h 21000"/>
+              <a:gd name="T34" fmla="*/ 0 w 10485"/>
+              <a:gd name="T35" fmla="*/ 20800 h 21000"/>
+              <a:gd name="T36" fmla="*/ 28 w 10485"/>
+              <a:gd name="T37" fmla="*/ 20830 h 21000"/>
+              <a:gd name="T38" fmla="*/ 199 w 10485"/>
+              <a:gd name="T39" fmla="*/ 20999 h 21000"/>
+              <a:gd name="T40" fmla="*/ 227 w 10485"/>
+              <a:gd name="T41" fmla="*/ 20999 h 21000"/>
+              <a:gd name="T42" fmla="*/ 255 w 10485"/>
+              <a:gd name="T43" fmla="*/ 20999 h 21000"/>
+              <a:gd name="T44" fmla="*/ 255 w 10485"/>
+              <a:gd name="T45" fmla="*/ 20942 h 21000"/>
+              <a:gd name="T46" fmla="*/ 141 w 10485"/>
+              <a:gd name="T47" fmla="*/ 20830 h 21000"/>
+              <a:gd name="T48" fmla="*/ 7453 w 10485"/>
+              <a:gd name="T49" fmla="*/ 17769 h 21000"/>
+              <a:gd name="T50" fmla="*/ 10484 w 10485"/>
+              <a:gd name="T51" fmla="*/ 10372 h 21000"/>
+            </a:gdLst>
+            <a:ahLst/>
+            <a:cxnLst>
+              <a:cxn ang="0">
+                <a:pos x="T0" y="T1"/>
+              </a:cxn>
+              <a:cxn ang="0">
+                <a:pos x="T2" y="T3"/>
+              </a:cxn>
+              <a:cxn ang="0">
+                <a:pos x="T4" y="T5"/>
+              </a:cxn>
+              <a:cxn ang="0">
+                <a:pos x="T6" y="T7"/>
+              </a:cxn>
+              <a:cxn ang="0">
+                <a:pos x="T8" y="T9"/>
+              </a:cxn>
+              <a:cxn ang="0">
+                <a:pos x="T10" y="T11"/>
+              </a:cxn>
+              <a:cxn ang="0">
+                <a:pos x="T12" y="T13"/>
+              </a:cxn>
+              <a:cxn ang="0">
+                <a:pos x="T14" y="T15"/>
+              </a:cxn>
+              <a:cxn ang="0">
+                <a:pos x="T16" y="T17"/>
+              </a:cxn>
+              <a:cxn ang="0">
+                <a:pos x="T18" y="T19"/>
+              </a:cxn>
+              <a:cxn ang="0">
+                <a:pos x="T20" y="T21"/>
+              </a:cxn>
+              <a:cxn ang="0">
+                <a:pos x="T22" y="T23"/>
+              </a:cxn>
+              <a:cxn ang="0">
+                <a:pos x="T24" y="T25"/>
+              </a:cxn>
+              <a:cxn ang="0">
+                <a:pos x="T26" y="T27"/>
+              </a:cxn>
+              <a:cxn ang="0">
+                <a:pos x="T28" y="T29"/>
+              </a:cxn>
+              <a:cxn ang="0">
+                <a:pos x="T30" y="T31"/>
+              </a:cxn>
+              <a:cxn ang="0">
+                <a:pos x="T32" y="T33"/>
+              </a:cxn>
+              <a:cxn ang="0">
+                <a:pos x="T34" y="T35"/>
+              </a:cxn>
+              <a:cxn ang="0">
+                <a:pos x="T36" y="T37"/>
+              </a:cxn>
+              <a:cxn ang="0">
+                <a:pos x="T38" y="T39"/>
+              </a:cxn>
+              <a:cxn ang="0">
+                <a:pos x="T40" y="T41"/>
+              </a:cxn>
+              <a:cxn ang="0">
+                <a:pos x="T42" y="T43"/>
+              </a:cxn>
+              <a:cxn ang="0">
+                <a:pos x="T44" y="T45"/>
+              </a:cxn>
+              <a:cxn ang="0">
+                <a:pos x="T46" y="T47"/>
+              </a:cxn>
+              <a:cxn ang="0">
+                <a:pos x="T48" y="T49"/>
+              </a:cxn>
+              <a:cxn ang="0">
+                <a:pos x="T50" y="T51"/>
+              </a:cxn>
+            </a:cxnLst>
+            <a:rect l="0" t="0" r="r" b="b"/>
+            <a:pathLst>
+              <a:path w="10485" h="21000">
+                <a:moveTo>
+                  <a:pt x="10484" y="10372"/>
+                </a:moveTo>
+                <a:lnTo>
+                  <a:pt x="10484" y="10372"/>
+                </a:lnTo>
+                <a:cubicBezTo>
+                  <a:pt x="10484" y="7595"/>
+                  <a:pt x="9380" y="4988"/>
+                  <a:pt x="7396" y="3033"/>
+                </a:cubicBezTo>
+                <a:cubicBezTo>
+                  <a:pt x="5441" y="1076"/>
+                  <a:pt x="2834" y="0"/>
+                  <a:pt x="85" y="0"/>
+                </a:cubicBezTo>
+                <a:cubicBezTo>
+                  <a:pt x="56" y="0"/>
+                  <a:pt x="56" y="0"/>
+                  <a:pt x="28" y="0"/>
+                </a:cubicBezTo>
+                <a:cubicBezTo>
+                  <a:pt x="0" y="28"/>
+                  <a:pt x="0" y="28"/>
+                  <a:pt x="0" y="56"/>
+                </a:cubicBezTo>
+                <a:cubicBezTo>
+                  <a:pt x="0" y="85"/>
+                  <a:pt x="0" y="85"/>
+                  <a:pt x="28" y="85"/>
+                </a:cubicBezTo>
+                <a:lnTo>
+                  <a:pt x="28" y="85"/>
+                </a:lnTo>
+                <a:cubicBezTo>
+                  <a:pt x="56" y="85"/>
+                  <a:pt x="56" y="85"/>
+                  <a:pt x="85" y="85"/>
+                </a:cubicBezTo>
+                <a:cubicBezTo>
+                  <a:pt x="2806" y="85"/>
+                  <a:pt x="5413" y="1162"/>
+                  <a:pt x="7339" y="3089"/>
+                </a:cubicBezTo>
+                <a:cubicBezTo>
+                  <a:pt x="9294" y="5044"/>
+                  <a:pt x="10400" y="7623"/>
+                  <a:pt x="10400" y="10372"/>
+                </a:cubicBezTo>
+                <a:cubicBezTo>
+                  <a:pt x="10428" y="13149"/>
+                  <a:pt x="9351" y="15757"/>
+                  <a:pt x="7396" y="17712"/>
+                </a:cubicBezTo>
+                <a:cubicBezTo>
+                  <a:pt x="5469" y="19667"/>
+                  <a:pt x="2890" y="20744"/>
+                  <a:pt x="141" y="20744"/>
+                </a:cubicBezTo>
+                <a:cubicBezTo>
+                  <a:pt x="255" y="20659"/>
+                  <a:pt x="255" y="20659"/>
+                  <a:pt x="255" y="20659"/>
+                </a:cubicBezTo>
+                <a:cubicBezTo>
+                  <a:pt x="255" y="20631"/>
+                  <a:pt x="255" y="20603"/>
+                  <a:pt x="255" y="20603"/>
+                </a:cubicBezTo>
+                <a:cubicBezTo>
+                  <a:pt x="227" y="20574"/>
+                  <a:pt x="199" y="20574"/>
+                  <a:pt x="199" y="20603"/>
+                </a:cubicBezTo>
+                <a:cubicBezTo>
+                  <a:pt x="28" y="20772"/>
+                  <a:pt x="28" y="20772"/>
+                  <a:pt x="28" y="20772"/>
+                </a:cubicBezTo>
+                <a:cubicBezTo>
+                  <a:pt x="0" y="20772"/>
+                  <a:pt x="0" y="20800"/>
+                  <a:pt x="0" y="20800"/>
+                </a:cubicBezTo>
+                <a:cubicBezTo>
+                  <a:pt x="0" y="20800"/>
+                  <a:pt x="0" y="20830"/>
+                  <a:pt x="28" y="20830"/>
+                </a:cubicBezTo>
+                <a:cubicBezTo>
+                  <a:pt x="199" y="20999"/>
+                  <a:pt x="199" y="20999"/>
+                  <a:pt x="199" y="20999"/>
+                </a:cubicBezTo>
+                <a:cubicBezTo>
+                  <a:pt x="199" y="20999"/>
+                  <a:pt x="199" y="20999"/>
+                  <a:pt x="227" y="20999"/>
+                </a:cubicBezTo>
+                <a:lnTo>
+                  <a:pt x="255" y="20999"/>
+                </a:lnTo>
+                <a:cubicBezTo>
+                  <a:pt x="255" y="20971"/>
+                  <a:pt x="255" y="20971"/>
+                  <a:pt x="255" y="20942"/>
+                </a:cubicBezTo>
+                <a:cubicBezTo>
+                  <a:pt x="141" y="20830"/>
+                  <a:pt x="141" y="20830"/>
+                  <a:pt x="141" y="20830"/>
+                </a:cubicBezTo>
+                <a:cubicBezTo>
+                  <a:pt x="2919" y="20830"/>
+                  <a:pt x="5526" y="19724"/>
+                  <a:pt x="7453" y="17769"/>
+                </a:cubicBezTo>
+                <a:cubicBezTo>
+                  <a:pt x="9436" y="15785"/>
+                  <a:pt x="10484" y="13177"/>
+                  <a:pt x="10484" y="10372"/>
+                </a:cubicBezTo>
+              </a:path>
+            </a:pathLst>
+          </a:custGeom>
+          <a:solidFill>
+            <a:srgbClr val="E87700"/>
+          </a:solidFill>
+          <a:ln>
+            <a:noFill/>
+          </a:ln>
+          <a:effectLst/>
+        </p:spPr>
+        <p:txBody>
+          <a:bodyPr wrap="none" anchor="ctr"/>
+          <a:lstStyle/>
+          <a:p>
+            <a:pPr marL="0" marR="0" lvl="0" indent="0" defTabSz="914400" eaLnBrk="1" fontAlgn="auto" latinLnBrk="0" hangingPunct="1">
+              <a:lnSpc>
+                <a:spcPct val="100000"/>
+              </a:lnSpc>
+              <a:spcBef>
+                <a:spcPts val="0"/>
+              </a:spcBef>
+              <a:spcAft>
+                <a:spcPts val="0"/>
+              </a:spcAft>
+              <a:buClrTx/>
+              <a:buSzTx/>
+              <a:buFontTx/>
+              <a:buNone/>
+              <a:tabLst/>
+              <a:defRPr/>
+            </a:pPr>
+            <a:endParaRPr kumimoji="0" lang="en-US" sz="1800" b="0" i="0" u="none" strike="noStrike" kern="0" cap="none" spc="0" normalizeH="0" baseline="0" noProof="0">
+              <a:ln>
+                <a:noFill/>
+              </a:ln>
+              <a:solidFill>
+                <a:srgbClr val="000000"/>
+              </a:solidFill>
+              <a:effectLst/>
+              <a:uLnTx/>
+              <a:uFillTx/>
+              <a:latin typeface="Franklin Gothic Book"/>
+            </a:endParaRPr>
+          </a:p>
+        </p:txBody>
+      </p:sp>
+      <p:sp>
+        <p:nvSpPr>
+          <p:cNvPr id="56" name="Oval 55"/>
+          <p:cNvSpPr/>
+          <p:nvPr/>
+        </p:nvSpPr>
+        <p:spPr>
+          <a:xfrm>
+            <a:off x="6876257" y="-1464905"/>
+            <a:ext cx="3200400" cy="3200400"/>
+          </a:xfrm>
+          <a:prstGeom prst="ellipse">
+            <a:avLst/>
+          </a:prstGeom>
+          <a:noFill/>
+          <a:ln w="152400" cap="flat" cmpd="sng" algn="ctr">
+            <a:solidFill>
+              <a:srgbClr val="E87700"/>
+            </a:solidFill>
+            <a:prstDash val="solid"/>
+            <a:miter lim="800000"/>
+          </a:ln>
+          <a:effectLst/>
+        </p:spPr>
+        <p:txBody>
+          <a:bodyPr rtlCol="0" anchor="ctr"/>
+          <a:lstStyle/>
+          <a:p>
+            <a:pPr marL="0" marR="0" lvl="0" indent="0" algn="ctr" defTabSz="914400" eaLnBrk="1" fontAlgn="auto" latinLnBrk="0" hangingPunct="1">
+              <a:lnSpc>
+                <a:spcPct val="100000"/>
+              </a:lnSpc>
+              <a:spcBef>
+                <a:spcPts val="0"/>
+              </a:spcBef>
+              <a:spcAft>
+                <a:spcPts val="0"/>
+              </a:spcAft>
+              <a:buClrTx/>
+              <a:buSzTx/>
+              <a:buFontTx/>
+              <a:buNone/>
+              <a:tabLst/>
+              <a:defRPr/>
+            </a:pPr>
+            <a:endParaRPr kumimoji="0" lang="en-US" sz="1800" b="0" i="0" u="none" strike="noStrike" kern="0" cap="none" spc="0" normalizeH="0" baseline="0" noProof="0">
+              <a:ln>
+                <a:noFill/>
+              </a:ln>
+              <a:solidFill>
+                <a:srgbClr val="FFFFFF"/>
+              </a:solidFill>
+              <a:effectLst/>
+              <a:uLnTx/>
+              <a:uFillTx/>
+              <a:latin typeface="Franklin Gothic Book"/>
+              <a:ea typeface="+mn-ea"/>
+              <a:cs typeface="+mn-cs"/>
+            </a:endParaRPr>
+          </a:p>
+        </p:txBody>
+      </p:sp>
+      <p:grpSp>
+        <p:nvGrpSpPr>
+          <p:cNvPr id="31" name="Group 30">
+            <a:extLst>
+              <a:ext uri="{FF2B5EF4-FFF2-40B4-BE49-F238E27FC236}">
+                <a16:creationId xmlns:a16="http://schemas.microsoft.com/office/drawing/2014/main" id="{851242CC-F11C-4006-A017-AE348D49B2CA}"/>
+              </a:ext>
+            </a:extLst>
+          </p:cNvPr>
+          <p:cNvGrpSpPr/>
+          <p:nvPr/>
+        </p:nvGrpSpPr>
+        <p:grpSpPr>
+          <a:xfrm>
+            <a:off x="2296535" y="-99392"/>
+            <a:ext cx="865307" cy="865307"/>
+            <a:chOff x="4355168" y="1122321"/>
+            <a:chExt cx="1153743" cy="1153743"/>
+          </a:xfrm>
+        </p:grpSpPr>
+        <p:sp>
+          <p:nvSpPr>
+            <p:cNvPr id="47" name="Oval 46">
+              <a:extLst>
+                <a:ext uri="{FF2B5EF4-FFF2-40B4-BE49-F238E27FC236}">
+                  <a16:creationId xmlns:a16="http://schemas.microsoft.com/office/drawing/2014/main" id="{ACB45F8C-D6AE-4E17-9746-37FFD2CDE118}"/>
+                </a:ext>
+              </a:extLst>
+            </p:cNvPr>
+            <p:cNvSpPr/>
+            <p:nvPr/>
+          </p:nvSpPr>
+          <p:spPr>
+            <a:xfrm>
+              <a:off x="4572000" y="1339153"/>
+              <a:ext cx="720080" cy="720080"/>
+            </a:xfrm>
+            <a:prstGeom prst="ellipse">
+              <a:avLst/>
+            </a:prstGeom>
+            <a:blipFill dpi="0" rotWithShape="1">
+              <a:blip r:embed="rId6" cstate="print">
+                <a:extLst>
+                  <a:ext uri="{28A0092B-C50C-407E-A947-70E740481C1C}">
+                    <a14:useLocalDpi xmlns:a14="http://schemas.microsoft.com/office/drawing/2010/main" val="0"/>
+                  </a:ext>
+                </a:extLst>
+              </a:blip>
+              <a:srcRect/>
+              <a:stretch>
+                <a:fillRect/>
+              </a:stretch>
+            </a:blipFill>
+            <a:ln w="38100">
+              <a:solidFill>
+                <a:srgbClr val="00A3B2"/>
+              </a:solidFill>
+            </a:ln>
+            <a:effectLst>
+              <a:glow rad="50800">
+                <a:schemeClr val="tx1">
+                  <a:alpha val="10000"/>
+                </a:schemeClr>
+              </a:glow>
+              <a:innerShdw blurRad="127000">
+                <a:schemeClr val="tx1"/>
+              </a:innerShdw>
+              <a:softEdge rad="0"/>
+            </a:effectLst>
+          </p:spPr>
+          <p:style>
+            <a:lnRef idx="2">
+              <a:schemeClr val="accent1">
+                <a:shade val="50000"/>
+              </a:schemeClr>
+            </a:lnRef>
+            <a:fillRef idx="1">
+              <a:schemeClr val="accent1"/>
+            </a:fillRef>
+            <a:effectRef idx="0">
+              <a:schemeClr val="accent1"/>
+            </a:effectRef>
+            <a:fontRef idx="minor">
+              <a:schemeClr val="lt1"/>
+            </a:fontRef>
+          </p:style>
+          <p:txBody>
+            <a:bodyPr wrap="none" lIns="0" tIns="0" rIns="0" bIns="0" rtlCol="0" anchor="ctr">
+              <a:noAutofit/>
+            </a:bodyPr>
+            <a:lstStyle/>
+            <a:p>
+              <a:pPr algn="ctr"/>
+              <a:r>
+                <a:rPr lang="en-GB" sz="3200" b="1" dirty="0">
+                  <a:solidFill>
+                    <a:schemeClr val="lt1">
+                      <a:alpha val="75000"/>
+                    </a:schemeClr>
+                  </a:solidFill>
+                  <a:latin typeface="Open Sans Semibold" panose="020B0706030804020204" pitchFamily="34" charset="0"/>
+                  <a:ea typeface="Open Sans Semibold" panose="020B0706030804020204" pitchFamily="34" charset="0"/>
+                  <a:cs typeface="Open Sans Semibold" panose="020B0706030804020204" pitchFamily="34" charset="0"/>
+                </a:rPr>
+                <a:t>1</a:t>
+              </a:r>
+            </a:p>
+          </p:txBody>
+        </p:sp>
+        <p:sp>
+          <p:nvSpPr>
+            <p:cNvPr id="49" name="Rectangle 48">
+              <a:extLst>
+                <a:ext uri="{FF2B5EF4-FFF2-40B4-BE49-F238E27FC236}">
+                  <a16:creationId xmlns:a16="http://schemas.microsoft.com/office/drawing/2014/main" id="{B0FF7C54-EAE6-406F-8C25-0C86BCDCB271}"/>
+                </a:ext>
+              </a:extLst>
+            </p:cNvPr>
+            <p:cNvSpPr/>
+            <p:nvPr/>
+          </p:nvSpPr>
+          <p:spPr>
+            <a:xfrm rot="19883534">
+              <a:off x="4355168" y="1122321"/>
+              <a:ext cx="1153743" cy="1153743"/>
+            </a:xfrm>
+            <a:prstGeom prst="rect">
+              <a:avLst/>
+            </a:prstGeom>
+            <a:noFill/>
+          </p:spPr>
+          <p:txBody>
+            <a:bodyPr wrap="none" lIns="91440" tIns="45720" rIns="91440" bIns="45720">
+              <a:prstTxWarp prst="textArchDown">
+                <a:avLst>
+                  <a:gd name="adj" fmla="val 2671068"/>
+                </a:avLst>
+              </a:prstTxWarp>
+              <a:spAutoFit/>
+            </a:bodyPr>
+            <a:lstStyle/>
+            <a:p>
+              <a:pPr algn="ctr"/>
+              <a:r>
+                <a:rPr lang="en-US" sz="5400" b="1" cap="none" spc="0" dirty="0">
+                  <a:ln w="12700">
+                    <a:noFill/>
+                    <a:prstDash val="solid"/>
+                  </a:ln>
+                  <a:solidFill>
+                    <a:srgbClr val="00A3B2"/>
+                  </a:solidFill>
+                  <a:latin typeface="Open Sans Semibold" panose="020B0706030804020204" pitchFamily="34" charset="0"/>
+                  <a:ea typeface="Open Sans Semibold" panose="020B0706030804020204" pitchFamily="34" charset="0"/>
+                  <a:cs typeface="Open Sans Semibold" panose="020B0706030804020204" pitchFamily="34" charset="0"/>
+                </a:rPr>
+                <a:t>Discovery</a:t>
+              </a:r>
+            </a:p>
+          </p:txBody>
+        </p:sp>
+      </p:grpSp>
+      <p:grpSp>
+        <p:nvGrpSpPr>
+          <p:cNvPr id="50" name="Group 49">
+            <a:extLst>
+              <a:ext uri="{FF2B5EF4-FFF2-40B4-BE49-F238E27FC236}">
+                <a16:creationId xmlns:a16="http://schemas.microsoft.com/office/drawing/2014/main" id="{4D719CA4-760C-4AB7-A865-474845AA8441}"/>
+              </a:ext>
+            </a:extLst>
+          </p:cNvPr>
+          <p:cNvGrpSpPr/>
+          <p:nvPr/>
+        </p:nvGrpSpPr>
+        <p:grpSpPr>
+          <a:xfrm>
+            <a:off x="-78264" y="692696"/>
+            <a:ext cx="833840" cy="833840"/>
+            <a:chOff x="4382122" y="1143299"/>
+            <a:chExt cx="1111787" cy="1111787"/>
+          </a:xfrm>
+        </p:grpSpPr>
+        <p:sp>
+          <p:nvSpPr>
+            <p:cNvPr id="52" name="Oval 51">
+              <a:extLst>
+                <a:ext uri="{FF2B5EF4-FFF2-40B4-BE49-F238E27FC236}">
+                  <a16:creationId xmlns:a16="http://schemas.microsoft.com/office/drawing/2014/main" id="{00BBEB2D-2C82-4C64-90B0-DBACE2F44718}"/>
+                </a:ext>
+              </a:extLst>
+            </p:cNvPr>
+            <p:cNvSpPr/>
+            <p:nvPr/>
+          </p:nvSpPr>
+          <p:spPr>
+            <a:xfrm>
+              <a:off x="4572000" y="1339153"/>
+              <a:ext cx="720080" cy="720080"/>
+            </a:xfrm>
+            <a:prstGeom prst="ellipse">
+              <a:avLst/>
+            </a:prstGeom>
+            <a:blipFill dpi="0" rotWithShape="0">
+              <a:blip r:embed="rId7"/>
+              <a:srcRect/>
+              <a:stretch>
+                <a:fillRect/>
+              </a:stretch>
+            </a:blipFill>
+            <a:ln w="38100">
+              <a:solidFill>
+                <a:srgbClr val="D22938"/>
+              </a:solidFill>
+            </a:ln>
+            <a:effectLst>
+              <a:glow rad="50800">
+                <a:schemeClr val="tx1">
+                  <a:alpha val="10000"/>
+                </a:schemeClr>
+              </a:glow>
+              <a:innerShdw blurRad="127000">
+                <a:schemeClr val="tx1"/>
+              </a:innerShdw>
+              <a:softEdge rad="0"/>
+            </a:effectLst>
+          </p:spPr>
+          <p:style>
+            <a:lnRef idx="2">
+              <a:schemeClr val="accent1">
+                <a:shade val="50000"/>
+              </a:schemeClr>
+            </a:lnRef>
+            <a:fillRef idx="1">
+              <a:schemeClr val="accent1"/>
+            </a:fillRef>
+            <a:effectRef idx="0">
+              <a:schemeClr val="accent1"/>
+            </a:effectRef>
+            <a:fontRef idx="minor">
+              <a:schemeClr val="lt1"/>
+            </a:fontRef>
+          </p:style>
+          <p:txBody>
+            <a:bodyPr wrap="none" lIns="0" tIns="0" rIns="0" bIns="0" rtlCol="0" anchor="ctr">
+              <a:noAutofit/>
+            </a:bodyPr>
+            <a:lstStyle/>
+            <a:p>
+              <a:pPr algn="ctr"/>
+              <a:r>
+                <a:rPr lang="en-GB" sz="3200" b="1" dirty="0">
+                  <a:solidFill>
+                    <a:schemeClr val="lt1">
+                      <a:alpha val="75000"/>
+                    </a:schemeClr>
+                  </a:solidFill>
+                  <a:latin typeface="Open Sans Semibold" panose="020B0706030804020204" pitchFamily="34" charset="0"/>
+                  <a:ea typeface="Open Sans Semibold" panose="020B0706030804020204" pitchFamily="34" charset="0"/>
+                  <a:cs typeface="Open Sans Semibold" panose="020B0706030804020204" pitchFamily="34" charset="0"/>
+                </a:rPr>
+                <a:t>3</a:t>
+              </a:r>
+            </a:p>
+          </p:txBody>
+        </p:sp>
+        <p:sp>
+          <p:nvSpPr>
+            <p:cNvPr id="53" name="Rectangle 52">
+              <a:extLst>
+                <a:ext uri="{FF2B5EF4-FFF2-40B4-BE49-F238E27FC236}">
+                  <a16:creationId xmlns:a16="http://schemas.microsoft.com/office/drawing/2014/main" id="{B07605DD-6BFD-4BE3-80DB-F68DFE37454F}"/>
+                </a:ext>
+              </a:extLst>
+            </p:cNvPr>
+            <p:cNvSpPr/>
+            <p:nvPr/>
+          </p:nvSpPr>
+          <p:spPr>
+            <a:xfrm rot="20967821">
+              <a:off x="4382122" y="1143299"/>
+              <a:ext cx="1111787" cy="1111787"/>
+            </a:xfrm>
+            <a:prstGeom prst="rect">
+              <a:avLst/>
+            </a:prstGeom>
+            <a:noFill/>
+          </p:spPr>
+          <p:txBody>
+            <a:bodyPr wrap="none" lIns="91440" tIns="45720" rIns="91440" bIns="45720">
+              <a:prstTxWarp prst="textArchDown">
+                <a:avLst>
+                  <a:gd name="adj" fmla="val 3406206"/>
+                </a:avLst>
+              </a:prstTxWarp>
+              <a:spAutoFit/>
+            </a:bodyPr>
+            <a:lstStyle/>
+            <a:p>
+              <a:pPr algn="ctr"/>
+              <a:r>
+                <a:rPr lang="en-US" sz="5400" b="1" cap="none" spc="0" dirty="0">
+                  <a:ln w="12700">
+                    <a:noFill/>
+                    <a:prstDash val="solid"/>
+                  </a:ln>
+                  <a:solidFill>
+                    <a:srgbClr val="D22938"/>
+                  </a:solidFill>
+                  <a:latin typeface="Open Sans Semibold" panose="020B0706030804020204" pitchFamily="34" charset="0"/>
+                  <a:ea typeface="Open Sans Semibold" panose="020B0706030804020204" pitchFamily="34" charset="0"/>
+                  <a:cs typeface="Open Sans Semibold" panose="020B0706030804020204" pitchFamily="34" charset="0"/>
+                </a:rPr>
+                <a:t>Writing</a:t>
+              </a:r>
+            </a:p>
+          </p:txBody>
+        </p:sp>
+      </p:grpSp>
+    </p:spTree>
+    <p:extLst>
+      <p:ext uri="{BB962C8B-B14F-4D97-AF65-F5344CB8AC3E}">
+        <p14:creationId xmlns:p14="http://schemas.microsoft.com/office/powerpoint/2010/main" val="1132080460"/>
+      </p:ext>
+    </p:extLst>
+  </p:cSld>
+  <p:clrMapOvr>
+    <a:masterClrMapping/>
+  </p:clrMapOvr>
+</p:sld>
+</file>
+
+<file path=ppt/slides/slide5.xml><?xml version="1.0" encoding="utf-8"?>
+<p:sld xmlns:a="http://schemas.openxmlformats.org/drawingml/2006/main" xmlns:r="http://schemas.openxmlformats.org/officeDocument/2006/relationships" xmlns:p="http://schemas.openxmlformats.org/presentationml/2006/main">
+  <p:cSld>
+    <p:spTree>
+      <p:nvGrpSpPr>
+        <p:cNvPr id="1" name=""/>
+        <p:cNvGrpSpPr/>
+        <p:nvPr/>
+      </p:nvGrpSpPr>
+      <p:grpSpPr>
+        <a:xfrm>
+          <a:off x="0" y="0"/>
+          <a:ext cx="0" cy="0"/>
+          <a:chOff x="0" y="0"/>
+          <a:chExt cx="0" cy="0"/>
+        </a:xfrm>
+      </p:grpSpPr>
+      <p:sp>
+        <p:nvSpPr>
+          <p:cNvPr id="28" name="Freeform 27"/>
+          <p:cNvSpPr>
+            <a:spLocks noChangeArrowheads="1"/>
+          </p:cNvSpPr>
+          <p:nvPr/>
+        </p:nvSpPr>
+        <p:spPr bwMode="auto">
+          <a:xfrm rot="14285320" flipH="1" flipV="1">
+            <a:off x="20165" y="-2981305"/>
+            <a:ext cx="2827874" cy="5283661"/>
+          </a:xfrm>
+          <a:custGeom>
+            <a:avLst/>
+            <a:gdLst>
+              <a:gd name="T0" fmla="*/ 10484 w 10485"/>
+              <a:gd name="T1" fmla="*/ 10372 h 21000"/>
+              <a:gd name="T2" fmla="*/ 10484 w 10485"/>
+              <a:gd name="T3" fmla="*/ 10372 h 21000"/>
+              <a:gd name="T4" fmla="*/ 7396 w 10485"/>
+              <a:gd name="T5" fmla="*/ 3033 h 21000"/>
+              <a:gd name="T6" fmla="*/ 85 w 10485"/>
+              <a:gd name="T7" fmla="*/ 0 h 21000"/>
+              <a:gd name="T8" fmla="*/ 28 w 10485"/>
+              <a:gd name="T9" fmla="*/ 0 h 21000"/>
+              <a:gd name="T10" fmla="*/ 0 w 10485"/>
+              <a:gd name="T11" fmla="*/ 56 h 21000"/>
+              <a:gd name="T12" fmla="*/ 28 w 10485"/>
+              <a:gd name="T13" fmla="*/ 85 h 21000"/>
+              <a:gd name="T14" fmla="*/ 28 w 10485"/>
+              <a:gd name="T15" fmla="*/ 85 h 21000"/>
+              <a:gd name="T16" fmla="*/ 85 w 10485"/>
+              <a:gd name="T17" fmla="*/ 85 h 21000"/>
+              <a:gd name="T18" fmla="*/ 7339 w 10485"/>
+              <a:gd name="T19" fmla="*/ 3089 h 21000"/>
+              <a:gd name="T20" fmla="*/ 10400 w 10485"/>
+              <a:gd name="T21" fmla="*/ 10372 h 21000"/>
+              <a:gd name="T22" fmla="*/ 7396 w 10485"/>
+              <a:gd name="T23" fmla="*/ 17712 h 21000"/>
+              <a:gd name="T24" fmla="*/ 141 w 10485"/>
+              <a:gd name="T25" fmla="*/ 20744 h 21000"/>
+              <a:gd name="T26" fmla="*/ 255 w 10485"/>
+              <a:gd name="T27" fmla="*/ 20659 h 21000"/>
+              <a:gd name="T28" fmla="*/ 255 w 10485"/>
+              <a:gd name="T29" fmla="*/ 20603 h 21000"/>
+              <a:gd name="T30" fmla="*/ 199 w 10485"/>
+              <a:gd name="T31" fmla="*/ 20603 h 21000"/>
+              <a:gd name="T32" fmla="*/ 28 w 10485"/>
+              <a:gd name="T33" fmla="*/ 20772 h 21000"/>
+              <a:gd name="T34" fmla="*/ 0 w 10485"/>
+              <a:gd name="T35" fmla="*/ 20800 h 21000"/>
+              <a:gd name="T36" fmla="*/ 28 w 10485"/>
+              <a:gd name="T37" fmla="*/ 20830 h 21000"/>
+              <a:gd name="T38" fmla="*/ 199 w 10485"/>
+              <a:gd name="T39" fmla="*/ 20999 h 21000"/>
+              <a:gd name="T40" fmla="*/ 227 w 10485"/>
+              <a:gd name="T41" fmla="*/ 20999 h 21000"/>
+              <a:gd name="T42" fmla="*/ 255 w 10485"/>
+              <a:gd name="T43" fmla="*/ 20999 h 21000"/>
+              <a:gd name="T44" fmla="*/ 255 w 10485"/>
+              <a:gd name="T45" fmla="*/ 20942 h 21000"/>
+              <a:gd name="T46" fmla="*/ 141 w 10485"/>
+              <a:gd name="T47" fmla="*/ 20830 h 21000"/>
+              <a:gd name="T48" fmla="*/ 7453 w 10485"/>
+              <a:gd name="T49" fmla="*/ 17769 h 21000"/>
+              <a:gd name="T50" fmla="*/ 10484 w 10485"/>
+              <a:gd name="T51" fmla="*/ 10372 h 21000"/>
+            </a:gdLst>
+            <a:ahLst/>
+            <a:cxnLst>
+              <a:cxn ang="0">
+                <a:pos x="T0" y="T1"/>
+              </a:cxn>
+              <a:cxn ang="0">
+                <a:pos x="T2" y="T3"/>
+              </a:cxn>
+              <a:cxn ang="0">
+                <a:pos x="T4" y="T5"/>
+              </a:cxn>
+              <a:cxn ang="0">
+                <a:pos x="T6" y="T7"/>
+              </a:cxn>
+              <a:cxn ang="0">
+                <a:pos x="T8" y="T9"/>
+              </a:cxn>
+              <a:cxn ang="0">
+                <a:pos x="T10" y="T11"/>
+              </a:cxn>
+              <a:cxn ang="0">
+                <a:pos x="T12" y="T13"/>
+              </a:cxn>
+              <a:cxn ang="0">
+                <a:pos x="T14" y="T15"/>
+              </a:cxn>
+              <a:cxn ang="0">
+                <a:pos x="T16" y="T17"/>
+              </a:cxn>
+              <a:cxn ang="0">
+                <a:pos x="T18" y="T19"/>
+              </a:cxn>
+              <a:cxn ang="0">
+                <a:pos x="T20" y="T21"/>
+              </a:cxn>
+              <a:cxn ang="0">
+                <a:pos x="T22" y="T23"/>
+              </a:cxn>
+              <a:cxn ang="0">
+                <a:pos x="T24" y="T25"/>
+              </a:cxn>
+              <a:cxn ang="0">
+                <a:pos x="T26" y="T27"/>
+              </a:cxn>
+              <a:cxn ang="0">
+                <a:pos x="T28" y="T29"/>
+              </a:cxn>
+              <a:cxn ang="0">
+                <a:pos x="T30" y="T31"/>
+              </a:cxn>
+              <a:cxn ang="0">
+                <a:pos x="T32" y="T33"/>
+              </a:cxn>
+              <a:cxn ang="0">
+                <a:pos x="T34" y="T35"/>
+              </a:cxn>
+              <a:cxn ang="0">
+                <a:pos x="T36" y="T37"/>
+              </a:cxn>
+              <a:cxn ang="0">
+                <a:pos x="T38" y="T39"/>
+              </a:cxn>
+              <a:cxn ang="0">
+                <a:pos x="T40" y="T41"/>
+              </a:cxn>
+              <a:cxn ang="0">
+                <a:pos x="T42" y="T43"/>
+              </a:cxn>
+              <a:cxn ang="0">
+                <a:pos x="T44" y="T45"/>
+              </a:cxn>
+              <a:cxn ang="0">
+                <a:pos x="T46" y="T47"/>
+              </a:cxn>
+              <a:cxn ang="0">
+                <a:pos x="T48" y="T49"/>
+              </a:cxn>
+              <a:cxn ang="0">
+                <a:pos x="T50" y="T51"/>
+              </a:cxn>
+            </a:cxnLst>
+            <a:rect l="0" t="0" r="r" b="b"/>
+            <a:pathLst>
+              <a:path w="10485" h="21000">
+                <a:moveTo>
+                  <a:pt x="10484" y="10372"/>
+                </a:moveTo>
+                <a:lnTo>
+                  <a:pt x="10484" y="10372"/>
+                </a:lnTo>
+                <a:cubicBezTo>
+                  <a:pt x="10484" y="7595"/>
+                  <a:pt x="9380" y="4988"/>
+                  <a:pt x="7396" y="3033"/>
+                </a:cubicBezTo>
+                <a:cubicBezTo>
+                  <a:pt x="5441" y="1076"/>
+                  <a:pt x="2834" y="0"/>
+                  <a:pt x="85" y="0"/>
+                </a:cubicBezTo>
+                <a:cubicBezTo>
+                  <a:pt x="56" y="0"/>
+                  <a:pt x="56" y="0"/>
+                  <a:pt x="28" y="0"/>
+                </a:cubicBezTo>
+                <a:cubicBezTo>
+                  <a:pt x="0" y="28"/>
+                  <a:pt x="0" y="28"/>
+                  <a:pt x="0" y="56"/>
+                </a:cubicBezTo>
+                <a:cubicBezTo>
+                  <a:pt x="0" y="85"/>
+                  <a:pt x="0" y="85"/>
+                  <a:pt x="28" y="85"/>
+                </a:cubicBezTo>
+                <a:lnTo>
+                  <a:pt x="28" y="85"/>
+                </a:lnTo>
+                <a:cubicBezTo>
+                  <a:pt x="56" y="85"/>
+                  <a:pt x="56" y="85"/>
+                  <a:pt x="85" y="85"/>
+                </a:cubicBezTo>
+                <a:cubicBezTo>
+                  <a:pt x="2806" y="85"/>
+                  <a:pt x="5413" y="1162"/>
+                  <a:pt x="7339" y="3089"/>
+                </a:cubicBezTo>
+                <a:cubicBezTo>
+                  <a:pt x="9294" y="5044"/>
+                  <a:pt x="10400" y="7623"/>
+                  <a:pt x="10400" y="10372"/>
+                </a:cubicBezTo>
+                <a:cubicBezTo>
+                  <a:pt x="10428" y="13149"/>
+                  <a:pt x="9351" y="15757"/>
+                  <a:pt x="7396" y="17712"/>
+                </a:cubicBezTo>
+                <a:cubicBezTo>
+                  <a:pt x="5469" y="19667"/>
+                  <a:pt x="2890" y="20744"/>
+                  <a:pt x="141" y="20744"/>
+                </a:cubicBezTo>
+                <a:cubicBezTo>
+                  <a:pt x="255" y="20659"/>
+                  <a:pt x="255" y="20659"/>
+                  <a:pt x="255" y="20659"/>
+                </a:cubicBezTo>
+                <a:cubicBezTo>
+                  <a:pt x="255" y="20631"/>
+                  <a:pt x="255" y="20603"/>
+                  <a:pt x="255" y="20603"/>
+                </a:cubicBezTo>
+                <a:cubicBezTo>
+                  <a:pt x="227" y="20574"/>
+                  <a:pt x="199" y="20574"/>
+                  <a:pt x="199" y="20603"/>
+                </a:cubicBezTo>
+                <a:cubicBezTo>
+                  <a:pt x="28" y="20772"/>
+                  <a:pt x="28" y="20772"/>
+                  <a:pt x="28" y="20772"/>
+                </a:cubicBezTo>
+                <a:cubicBezTo>
+                  <a:pt x="0" y="20772"/>
+                  <a:pt x="0" y="20800"/>
+                  <a:pt x="0" y="20800"/>
+                </a:cubicBezTo>
+                <a:cubicBezTo>
+                  <a:pt x="0" y="20800"/>
+                  <a:pt x="0" y="20830"/>
+                  <a:pt x="28" y="20830"/>
+                </a:cubicBezTo>
+                <a:cubicBezTo>
+                  <a:pt x="199" y="20999"/>
+                  <a:pt x="199" y="20999"/>
+                  <a:pt x="199" y="20999"/>
+                </a:cubicBezTo>
+                <a:cubicBezTo>
+                  <a:pt x="199" y="20999"/>
+                  <a:pt x="199" y="20999"/>
+                  <a:pt x="227" y="20999"/>
+                </a:cubicBezTo>
+                <a:lnTo>
+                  <a:pt x="255" y="20999"/>
+                </a:lnTo>
+                <a:cubicBezTo>
+                  <a:pt x="255" y="20971"/>
+                  <a:pt x="255" y="20971"/>
+                  <a:pt x="255" y="20942"/>
+                </a:cubicBezTo>
+                <a:cubicBezTo>
+                  <a:pt x="141" y="20830"/>
+                  <a:pt x="141" y="20830"/>
+                  <a:pt x="141" y="20830"/>
+                </a:cubicBezTo>
+                <a:cubicBezTo>
+                  <a:pt x="2919" y="20830"/>
+                  <a:pt x="5526" y="19724"/>
+                  <a:pt x="7453" y="17769"/>
+                </a:cubicBezTo>
+                <a:cubicBezTo>
+                  <a:pt x="9436" y="15785"/>
+                  <a:pt x="10484" y="13177"/>
+                  <a:pt x="10484" y="10372"/>
+                </a:cubicBezTo>
+              </a:path>
+            </a:pathLst>
+          </a:custGeom>
+          <a:solidFill>
+            <a:schemeClr val="bg1">
+              <a:lumMod val="65000"/>
+            </a:schemeClr>
+          </a:solidFill>
+          <a:ln>
+            <a:noFill/>
+          </a:ln>
+          <a:effectLst/>
+        </p:spPr>
+        <p:txBody>
+          <a:bodyPr wrap="none" anchor="ctr"/>
+          <a:lstStyle/>
+          <a:p>
+            <a:pPr marL="0" marR="0" lvl="0" indent="0" defTabSz="914400" eaLnBrk="1" fontAlgn="auto" latinLnBrk="0" hangingPunct="1">
+              <a:lnSpc>
+                <a:spcPct val="100000"/>
+              </a:lnSpc>
+              <a:spcBef>
+                <a:spcPts val="0"/>
+              </a:spcBef>
+              <a:spcAft>
+                <a:spcPts val="0"/>
+              </a:spcAft>
+              <a:buClrTx/>
+              <a:buSzTx/>
+              <a:buFontTx/>
+              <a:buNone/>
+              <a:tabLst/>
+              <a:defRPr/>
+            </a:pPr>
+            <a:endParaRPr kumimoji="0" lang="en-US" sz="1800" b="0" i="0" u="none" strike="noStrike" kern="0" cap="none" spc="0" normalizeH="0" baseline="0" noProof="0">
               <a:ln>
                 <a:noFill/>
               </a:ln>
@@ -15111,7 +17677,7 @@
               <a:tabLst/>
               <a:defRPr/>
             </a:pPr>
-            <a:endParaRPr kumimoji="0" lang="en-US" sz="1800" b="0" i="0" u="none" strike="noStrike" kern="0" cap="none" spc="0" normalizeH="0" baseline="0" noProof="0" smtClean="0">
+            <a:endParaRPr kumimoji="0" lang="en-US" sz="1800" b="0" i="0" u="none" strike="noStrike" kern="0" cap="none" spc="0" normalizeH="0" baseline="0" noProof="0">
               <a:ln>
                 <a:noFill/>
               </a:ln>
@@ -15171,7 +17737,7 @@
               <a:tabLst/>
               <a:defRPr/>
             </a:pPr>
-            <a:endParaRPr kumimoji="0" lang="en-US" sz="1800" b="0" i="0" u="none" strike="noStrike" kern="0" cap="none" spc="0" normalizeH="0" baseline="0" noProof="0" smtClean="0">
+            <a:endParaRPr kumimoji="0" lang="en-US" sz="1800" b="0" i="0" u="none" strike="noStrike" kern="0" cap="none" spc="0" normalizeH="0" baseline="0" noProof="0">
               <a:ln>
                 <a:noFill/>
               </a:ln>
@@ -15198,17 +17764,10 @@
   <p:clrMapOvr>
     <a:masterClrMapping/>
   </p:clrMapOvr>
-  <p:timing>
-    <p:tnLst>
-      <p:par>
-        <p:cTn id="1" dur="indefinite" restart="never" nodeType="tmRoot"/>
-      </p:par>
-    </p:tnLst>
-  </p:timing>
 </p:sld>
 </file>
 
-<file path=ppt/slides/slide4.xml><?xml version="1.0" encoding="utf-8"?>
+<file path=ppt/slides/slide6.xml><?xml version="1.0" encoding="utf-8"?>
 <p:sld xmlns:a="http://schemas.openxmlformats.org/drawingml/2006/main" xmlns:r="http://schemas.openxmlformats.org/officeDocument/2006/relationships" xmlns:p="http://schemas.openxmlformats.org/presentationml/2006/main">
   <p:cSld>
     <p:spTree>
@@ -15534,7 +18093,7 @@
               <a:tabLst/>
               <a:defRPr/>
             </a:pPr>
-            <a:endParaRPr kumimoji="0" lang="en-US" sz="1800" b="0" i="0" u="none" strike="noStrike" kern="0" cap="none" spc="0" normalizeH="0" baseline="0" noProof="0" smtClean="0">
+            <a:endParaRPr kumimoji="0" lang="en-US" sz="1800" b="0" i="0" u="none" strike="noStrike" kern="0" cap="none" spc="0" normalizeH="0" baseline="0" noProof="0">
               <a:ln>
                 <a:noFill/>
               </a:ln>
@@ -18072,7 +20631,7 @@
               <a:tabLst/>
               <a:defRPr/>
             </a:pPr>
-            <a:endParaRPr kumimoji="0" lang="en-US" sz="1800" b="0" i="0" u="none" strike="noStrike" kern="0" cap="none" spc="0" normalizeH="0" baseline="0" noProof="0" smtClean="0">
+            <a:endParaRPr kumimoji="0" lang="en-US" sz="1800" b="0" i="0" u="none" strike="noStrike" kern="0" cap="none" spc="0" normalizeH="0" baseline="0" noProof="0">
               <a:ln>
                 <a:noFill/>
               </a:ln>
@@ -18132,7 +20691,7 @@
               <a:tabLst/>
               <a:defRPr/>
             </a:pPr>
-            <a:endParaRPr kumimoji="0" lang="en-US" sz="1800" b="0" i="0" u="none" strike="noStrike" kern="0" cap="none" spc="0" normalizeH="0" baseline="0" noProof="0" smtClean="0">
+            <a:endParaRPr kumimoji="0" lang="en-US" sz="1800" b="0" i="0" u="none" strike="noStrike" kern="0" cap="none" spc="0" normalizeH="0" baseline="0" noProof="0">
               <a:ln>
                 <a:noFill/>
               </a:ln>
@@ -18159,17 +20718,10 @@
   <p:clrMapOvr>
     <a:masterClrMapping/>
   </p:clrMapOvr>
-  <p:timing>
-    <p:tnLst>
-      <p:par>
-        <p:cTn id="1" dur="indefinite" restart="never" nodeType="tmRoot"/>
-      </p:par>
-    </p:tnLst>
-  </p:timing>
 </p:sld>
 </file>
 
-<file path=ppt/slides/slide5.xml><?xml version="1.0" encoding="utf-8"?>
+<file path=ppt/slides/slide7.xml><?xml version="1.0" encoding="utf-8"?>
 <p:sld xmlns:a="http://schemas.openxmlformats.org/drawingml/2006/main" xmlns:r="http://schemas.openxmlformats.org/officeDocument/2006/relationships" xmlns:p="http://schemas.openxmlformats.org/presentationml/2006/main">
   <p:cSld>
     <p:spTree>
@@ -18495,7 +21047,7 @@
               <a:tabLst/>
               <a:defRPr/>
             </a:pPr>
-            <a:endParaRPr kumimoji="0" lang="en-US" sz="1800" b="0" i="0" u="none" strike="noStrike" kern="0" cap="none" spc="0" normalizeH="0" baseline="0" noProof="0" smtClean="0">
+            <a:endParaRPr kumimoji="0" lang="en-US" sz="1800" b="0" i="0" u="none" strike="noStrike" kern="0" cap="none" spc="0" normalizeH="0" baseline="0" noProof="0">
               <a:ln>
                 <a:noFill/>
               </a:ln>
@@ -19135,7 +21687,7 @@
         </p:nvSpPr>
         <p:spPr>
           <a:xfrm>
-            <a:off x="2936993" y="3109679"/>
+            <a:off x="3270412" y="2790719"/>
             <a:ext cx="1053676" cy="1053676"/>
           </a:xfrm>
           <a:prstGeom prst="ellipse">
@@ -19199,76 +21751,6 @@
       </p:sp>
       <p:sp>
         <p:nvSpPr>
-          <p:cNvPr id="21" name="Oval 20"/>
-          <p:cNvSpPr/>
-          <p:nvPr/>
-        </p:nvSpPr>
-        <p:spPr>
-          <a:xfrm>
-            <a:off x="4027211" y="2023557"/>
-            <a:ext cx="850386" cy="850386"/>
-          </a:xfrm>
-          <a:prstGeom prst="ellipse">
-            <a:avLst/>
-          </a:prstGeom>
-          <a:solidFill>
-            <a:srgbClr val="92CB9C"/>
-          </a:solidFill>
-          <a:ln>
-            <a:noFill/>
-          </a:ln>
-        </p:spPr>
-        <p:style>
-          <a:lnRef idx="2">
-            <a:schemeClr val="accent1">
-              <a:shade val="50000"/>
-            </a:schemeClr>
-          </a:lnRef>
-          <a:fillRef idx="1">
-            <a:schemeClr val="accent1"/>
-          </a:fillRef>
-          <a:effectRef idx="0">
-            <a:schemeClr val="accent1"/>
-          </a:effectRef>
-          <a:fontRef idx="minor">
-            <a:schemeClr val="lt1"/>
-          </a:fontRef>
-        </p:style>
-        <p:txBody>
-          <a:bodyPr wrap="none" lIns="0" tIns="0" rIns="0" bIns="0" rtlCol="0" anchor="ctr">
-            <a:normAutofit/>
-          </a:bodyPr>
-          <a:lstStyle/>
-          <a:p>
-            <a:pPr algn="ctr"/>
-            <a:r>
-              <a:rPr lang="en-GB" sz="1000" dirty="0">
-                <a:latin typeface="Open Sans" panose="020B0606030504020204" pitchFamily="34" charset="0"/>
-                <a:ea typeface="Open Sans" panose="020B0606030504020204" pitchFamily="34" charset="0"/>
-                <a:cs typeface="Open Sans" panose="020B0606030504020204" pitchFamily="34" charset="0"/>
-              </a:rPr>
-              <a:t>Automated</a:t>
-            </a:r>
-            <a:br>
-              <a:rPr lang="en-GB" sz="1000" dirty="0">
-                <a:latin typeface="Open Sans" panose="020B0606030504020204" pitchFamily="34" charset="0"/>
-                <a:ea typeface="Open Sans" panose="020B0606030504020204" pitchFamily="34" charset="0"/>
-                <a:cs typeface="Open Sans" panose="020B0606030504020204" pitchFamily="34" charset="0"/>
-              </a:rPr>
-            </a:br>
-            <a:r>
-              <a:rPr lang="en-GB" sz="1000" dirty="0">
-                <a:latin typeface="Open Sans" panose="020B0606030504020204" pitchFamily="34" charset="0"/>
-                <a:ea typeface="Open Sans" panose="020B0606030504020204" pitchFamily="34" charset="0"/>
-                <a:cs typeface="Open Sans" panose="020B0606030504020204" pitchFamily="34" charset="0"/>
-              </a:rPr>
-              <a:t>Production</a:t>
-            </a:r>
-          </a:p>
-        </p:txBody>
-      </p:sp>
-      <p:sp>
-        <p:nvSpPr>
           <p:cNvPr id="23" name="Oval 22">
             <a:hlinkClick r:id="rId9"/>
           </p:cNvPr>
@@ -19277,7 +21759,7 @@
         </p:nvSpPr>
         <p:spPr>
           <a:xfrm>
-            <a:off x="3990670" y="2931927"/>
+            <a:off x="3954475" y="2082376"/>
             <a:ext cx="740574" cy="740574"/>
           </a:xfrm>
           <a:prstGeom prst="ellipse">
@@ -19404,7 +21886,7 @@
                 <a:ea typeface="Open Sans" panose="020B0606030504020204" pitchFamily="34" charset="0"/>
                 <a:cs typeface="Open Sans" panose="020B0606030504020204" pitchFamily="34" charset="0"/>
               </a:rPr>
-              <a:t>Colour</a:t>
+              <a:t>Color</a:t>
             </a:r>
             <a:br>
               <a:rPr lang="en-GB" sz="1200" dirty="0">
@@ -20416,7 +22898,7 @@
               <a:tabLst/>
               <a:defRPr/>
             </a:pPr>
-            <a:endParaRPr kumimoji="0" lang="en-US" sz="1800" b="0" i="0" u="none" strike="noStrike" kern="0" cap="none" spc="0" normalizeH="0" baseline="0" noProof="0" smtClean="0">
+            <a:endParaRPr kumimoji="0" lang="en-US" sz="1800" b="0" i="0" u="none" strike="noStrike" kern="0" cap="none" spc="0" normalizeH="0" baseline="0" noProof="0">
               <a:ln>
                 <a:noFill/>
               </a:ln>
@@ -20476,7 +22958,7 @@
               <a:tabLst/>
               <a:defRPr/>
             </a:pPr>
-            <a:endParaRPr kumimoji="0" lang="en-US" sz="1800" b="0" i="0" u="none" strike="noStrike" kern="0" cap="none" spc="0" normalizeH="0" baseline="0" noProof="0" smtClean="0">
+            <a:endParaRPr kumimoji="0" lang="en-US" sz="1800" b="0" i="0" u="none" strike="noStrike" kern="0" cap="none" spc="0" normalizeH="0" baseline="0" noProof="0">
               <a:ln>
                 <a:noFill/>
               </a:ln>
@@ -20493,6 +22975,87 @@
           </a:p>
         </p:txBody>
       </p:sp>
+      <p:sp>
+        <p:nvSpPr>
+          <p:cNvPr id="31" name="Oval 30">
+            <a:hlinkClick r:id="rId14"/>
+            <a:extLst>
+              <a:ext uri="{FF2B5EF4-FFF2-40B4-BE49-F238E27FC236}">
+                <a16:creationId xmlns:a16="http://schemas.microsoft.com/office/drawing/2014/main" id="{C18335C0-3AA7-4A43-A0A9-293C7CDAF017}"/>
+              </a:ext>
+            </a:extLst>
+          </p:cNvPr>
+          <p:cNvSpPr/>
+          <p:nvPr/>
+        </p:nvSpPr>
+        <p:spPr>
+          <a:xfrm>
+            <a:off x="6804248" y="3541540"/>
+            <a:ext cx="777240" cy="777240"/>
+          </a:xfrm>
+          <a:prstGeom prst="ellipse">
+            <a:avLst/>
+          </a:prstGeom>
+          <a:solidFill>
+            <a:srgbClr val="92CB9C"/>
+          </a:solidFill>
+          <a:ln>
+            <a:noFill/>
+          </a:ln>
+        </p:spPr>
+        <p:style>
+          <a:lnRef idx="2">
+            <a:schemeClr val="accent1">
+              <a:shade val="50000"/>
+            </a:schemeClr>
+          </a:lnRef>
+          <a:fillRef idx="1">
+            <a:schemeClr val="accent1"/>
+          </a:fillRef>
+          <a:effectRef idx="0">
+            <a:schemeClr val="accent1"/>
+          </a:effectRef>
+          <a:fontRef idx="minor">
+            <a:schemeClr val="lt1"/>
+          </a:fontRef>
+        </p:style>
+        <p:txBody>
+          <a:bodyPr wrap="none" lIns="0" tIns="0" rIns="0" bIns="0" rtlCol="0" anchor="ctr">
+            <a:normAutofit/>
+          </a:bodyPr>
+          <a:lstStyle/>
+          <a:p>
+            <a:pPr algn="ctr"/>
+            <a:r>
+              <a:rPr lang="en-GB" sz="800" dirty="0">
+                <a:latin typeface="Open Sans" panose="020B0606030504020204" pitchFamily="34" charset="0"/>
+                <a:ea typeface="Open Sans" panose="020B0606030504020204" pitchFamily="34" charset="0"/>
+                <a:cs typeface="Open Sans" panose="020B0606030504020204" pitchFamily="34" charset="0"/>
+              </a:rPr>
+              <a:t>Supplementary</a:t>
+            </a:r>
+          </a:p>
+          <a:p>
+            <a:pPr algn="ctr"/>
+            <a:r>
+              <a:rPr lang="en-GB" sz="800" dirty="0">
+                <a:latin typeface="Open Sans" panose="020B0606030504020204" pitchFamily="34" charset="0"/>
+                <a:ea typeface="Open Sans" panose="020B0606030504020204" pitchFamily="34" charset="0"/>
+                <a:cs typeface="Open Sans" panose="020B0606030504020204" pitchFamily="34" charset="0"/>
+              </a:rPr>
+              <a:t>Info</a:t>
+            </a:r>
+            <a:endParaRPr lang="en-GB" sz="800" dirty="0">
+              <a:solidFill>
+                <a:srgbClr val="FF0000"/>
+              </a:solidFill>
+              <a:latin typeface="Open Sans" panose="020B0606030504020204" pitchFamily="34" charset="0"/>
+              <a:ea typeface="Open Sans" panose="020B0606030504020204" pitchFamily="34" charset="0"/>
+              <a:cs typeface="Open Sans" panose="020B0606030504020204" pitchFamily="34" charset="0"/>
+            </a:endParaRPr>
+          </a:p>
+        </p:txBody>
+      </p:sp>
     </p:spTree>
     <p:extLst>
       <p:ext uri="{BB962C8B-B14F-4D97-AF65-F5344CB8AC3E}">
@@ -20503,17 +23066,10 @@
   <p:clrMapOvr>
     <a:masterClrMapping/>
   </p:clrMapOvr>
-  <p:timing>
-    <p:tnLst>
-      <p:par>
-        <p:cTn id="1" dur="indefinite" restart="never" nodeType="tmRoot"/>
-      </p:par>
-    </p:tnLst>
-  </p:timing>
 </p:sld>
 </file>
 
-<file path=ppt/slides/slide6.xml><?xml version="1.0" encoding="utf-8"?>
+<file path=ppt/slides/slide8.xml><?xml version="1.0" encoding="utf-8"?>
 <p:sld xmlns:a="http://schemas.openxmlformats.org/drawingml/2006/main" xmlns:r="http://schemas.openxmlformats.org/officeDocument/2006/relationships" xmlns:p="http://schemas.openxmlformats.org/presentationml/2006/main">
   <p:cSld>
     <p:spTree>
@@ -20839,7 +23395,7 @@
               <a:tabLst/>
               <a:defRPr/>
             </a:pPr>
-            <a:endParaRPr kumimoji="0" lang="en-US" sz="1800" b="0" i="0" u="none" strike="noStrike" kern="0" cap="none" spc="0" normalizeH="0" baseline="0" noProof="0" smtClean="0">
+            <a:endParaRPr kumimoji="0" lang="en-US" sz="1800" b="0" i="0" u="none" strike="noStrike" kern="0" cap="none" spc="0" normalizeH="0" baseline="0" noProof="0">
               <a:ln>
                 <a:noFill/>
               </a:ln>
@@ -21228,7 +23784,7 @@
           <a:p>
             <a:pPr algn="ctr"/>
             <a:r>
-              <a:rPr lang="en-GB" sz="1100" dirty="0" smtClean="0">
+              <a:rPr lang="en-GB" sz="1100" dirty="0">
                 <a:solidFill>
                   <a:srgbClr val="855199"/>
                 </a:solidFill>
@@ -23334,7 +25890,7 @@
               <a:tabLst/>
               <a:defRPr/>
             </a:pPr>
-            <a:endParaRPr kumimoji="0" lang="en-US" sz="1800" b="0" i="0" u="none" strike="noStrike" kern="0" cap="none" spc="0" normalizeH="0" baseline="0" noProof="0" smtClean="0">
+            <a:endParaRPr kumimoji="0" lang="en-US" sz="1800" b="0" i="0" u="none" strike="noStrike" kern="0" cap="none" spc="0" normalizeH="0" baseline="0" noProof="0">
               <a:ln>
                 <a:noFill/>
               </a:ln>
@@ -23394,7 +25950,7 @@
               <a:tabLst/>
               <a:defRPr/>
             </a:pPr>
-            <a:endParaRPr kumimoji="0" lang="en-US" sz="1800" b="0" i="0" u="none" strike="noStrike" kern="0" cap="none" spc="0" normalizeH="0" baseline="0" noProof="0" smtClean="0">
+            <a:endParaRPr kumimoji="0" lang="en-US" sz="1800" b="0" i="0" u="none" strike="noStrike" kern="0" cap="none" spc="0" normalizeH="0" baseline="0" noProof="0">
               <a:ln>
                 <a:noFill/>
               </a:ln>
@@ -23458,7 +26014,7 @@
           <a:p>
             <a:pPr algn="ctr"/>
             <a:r>
-              <a:rPr lang="en-GB" sz="1000" dirty="0" smtClean="0">
+              <a:rPr lang="en-GB" sz="1000" dirty="0">
                 <a:latin typeface="Open Sans" panose="020B0606030504020204" pitchFamily="34" charset="0"/>
                 <a:ea typeface="Open Sans" panose="020B0606030504020204" pitchFamily="34" charset="0"/>
                 <a:cs typeface="Open Sans" panose="020B0606030504020204" pitchFamily="34" charset="0"/>
@@ -23469,18 +26025,13 @@
           <a:p>
             <a:pPr algn="ctr"/>
             <a:r>
-              <a:rPr lang="en-GB" sz="1000" dirty="0" smtClean="0">
+              <a:rPr lang="en-GB" sz="1000" dirty="0">
                 <a:latin typeface="Open Sans" panose="020B0606030504020204" pitchFamily="34" charset="0"/>
                 <a:ea typeface="Open Sans" panose="020B0606030504020204" pitchFamily="34" charset="0"/>
                 <a:cs typeface="Open Sans" panose="020B0606030504020204" pitchFamily="34" charset="0"/>
               </a:rPr>
               <a:t>Share</a:t>
             </a:r>
-            <a:endParaRPr lang="en-GB" sz="1000" dirty="0">
-              <a:latin typeface="Open Sans" panose="020B0606030504020204" pitchFamily="34" charset="0"/>
-              <a:ea typeface="Open Sans" panose="020B0606030504020204" pitchFamily="34" charset="0"/>
-              <a:cs typeface="Open Sans" panose="020B0606030504020204" pitchFamily="34" charset="0"/>
-            </a:endParaRPr>
           </a:p>
         </p:txBody>
       </p:sp>
@@ -23494,17 +26045,10 @@
   <p:clrMapOvr>
     <a:masterClrMapping/>
   </p:clrMapOvr>
-  <p:timing>
-    <p:tnLst>
-      <p:par>
-        <p:cTn id="1" dur="indefinite" restart="never" nodeType="tmRoot"/>
-      </p:par>
-    </p:tnLst>
-  </p:timing>
 </p:sld>
 </file>
 
-<file path=ppt/slides/slide7.xml><?xml version="1.0" encoding="utf-8"?>
+<file path=ppt/slides/slide9.xml><?xml version="1.0" encoding="utf-8"?>
 <p:sld xmlns:a="http://schemas.openxmlformats.org/drawingml/2006/main" xmlns:r="http://schemas.openxmlformats.org/officeDocument/2006/relationships" xmlns:p="http://schemas.openxmlformats.org/presentationml/2006/main">
   <p:cSld>
     <p:spTree>
@@ -23830,7 +26374,7 @@
               <a:tabLst/>
               <a:defRPr/>
             </a:pPr>
-            <a:endParaRPr kumimoji="0" lang="en-US" sz="1800" b="0" i="0" u="none" strike="noStrike" kern="0" cap="none" spc="0" normalizeH="0" baseline="0" noProof="0" smtClean="0">
+            <a:endParaRPr kumimoji="0" lang="en-US" sz="1800" b="0" i="0" u="none" strike="noStrike" kern="0" cap="none" spc="0" normalizeH="0" baseline="0" noProof="0">
               <a:ln>
                 <a:noFill/>
               </a:ln>
@@ -24225,27 +26769,8 @@
                 <a:ea typeface="Open Sans Semibold" panose="020B0706030804020204" pitchFamily="34" charset="0"/>
                 <a:cs typeface="Open Sans Semibold" panose="020B0706030804020204" pitchFamily="34" charset="0"/>
               </a:rPr>
-              <a:t>Learning </a:t>
-            </a:r>
-            <a:r>
-              <a:rPr lang="en-GB" dirty="0" smtClean="0">
-                <a:solidFill>
-                  <a:srgbClr val="2A2A28"/>
-                </a:solidFill>
-                <a:latin typeface="Open Sans Semibold" panose="020B0706030804020204" pitchFamily="34" charset="0"/>
-                <a:ea typeface="Open Sans Semibold" panose="020B0706030804020204" pitchFamily="34" charset="0"/>
-                <a:cs typeface="Open Sans Semibold" panose="020B0706030804020204" pitchFamily="34" charset="0"/>
-              </a:rPr>
-              <a:t>Service</a:t>
-            </a:r>
-            <a:endParaRPr lang="en-GB" dirty="0">
-              <a:solidFill>
-                <a:srgbClr val="2A2A28"/>
-              </a:solidFill>
-              <a:latin typeface="Open Sans Semibold" panose="020B0706030804020204" pitchFamily="34" charset="0"/>
-              <a:ea typeface="Open Sans Semibold" panose="020B0706030804020204" pitchFamily="34" charset="0"/>
-              <a:cs typeface="Open Sans Semibold" panose="020B0706030804020204" pitchFamily="34" charset="0"/>
-            </a:endParaRPr>
+              <a:t>Learning Service</a:t>
+            </a:r>
           </a:p>
         </p:txBody>
       </p:sp>
@@ -25057,7 +27582,7 @@
               <a:tabLst/>
               <a:defRPr/>
             </a:pPr>
-            <a:endParaRPr kumimoji="0" lang="en-US" sz="1800" b="0" i="0" u="none" strike="noStrike" kern="0" cap="none" spc="0" normalizeH="0" baseline="0" noProof="0" smtClean="0">
+            <a:endParaRPr kumimoji="0" lang="en-US" sz="1800" b="0" i="0" u="none" strike="noStrike" kern="0" cap="none" spc="0" normalizeH="0" baseline="0" noProof="0">
               <a:ln>
                 <a:noFill/>
               </a:ln>
@@ -25117,7 +27642,7 @@
               <a:tabLst/>
               <a:defRPr/>
             </a:pPr>
-            <a:endParaRPr kumimoji="0" lang="en-US" sz="1800" b="0" i="0" u="none" strike="noStrike" kern="0" cap="none" spc="0" normalizeH="0" baseline="0" noProof="0" smtClean="0">
+            <a:endParaRPr kumimoji="0" lang="en-US" sz="1800" b="0" i="0" u="none" strike="noStrike" kern="0" cap="none" spc="0" normalizeH="0" baseline="0" noProof="0">
               <a:ln>
                 <a:noFill/>
               </a:ln>
@@ -25144,13 +27669,6 @@
   <p:clrMapOvr>
     <a:masterClrMapping/>
   </p:clrMapOvr>
-  <p:timing>
-    <p:tnLst>
-      <p:par>
-        <p:cTn id="1" dur="indefinite" restart="never" nodeType="tmRoot"/>
-      </p:par>
-    </p:tnLst>
-  </p:timing>
 </p:sld>
 </file>
 

</xml_diff>